<commit_message>
Ready for Main test1.sh
</commit_message>
<xml_diff>
--- a/Project Docs/ConvNN Poster.pptx
+++ b/Project Docs/ConvNN Poster.pptx
@@ -107,6 +107,11 @@
       </a:defRPr>
     </a:lvl9pPr>
   </p:defaultTextStyle>
+  <p:extLst>
+    <p:ext uri="{EFAFB233-063F-42B5-8137-9DF3F51BA10A}">
+      <p15:sldGuideLst xmlns:p15="http://schemas.microsoft.com/office/powerpoint/2012/main"/>
+    </p:ext>
+  </p:extLst>
 </p:presentation>
 </file>
 
@@ -192,7 +197,7 @@
           <a:p>
             <a:fld id="{97F067A0-B807-594B-857C-0B1CA98D0658}" type="datetimeFigureOut">
               <a:rPr lang="en-US" smtClean="0"/>
-              <a:t>8/8/25</a:t>
+              <a:t>8/24/25</a:t>
             </a:fld>
             <a:endParaRPr lang="en-US"/>
           </a:p>
@@ -724,7 +729,7 @@
           <a:p>
             <a:fld id="{2A84CB3F-E3C1-5B40-88B8-D14386A89107}" type="datetimeFigureOut">
               <a:rPr lang="en-US" smtClean="0"/>
-              <a:t>8/8/25</a:t>
+              <a:t>8/24/25</a:t>
             </a:fld>
             <a:endParaRPr lang="en-US"/>
           </a:p>
@@ -894,7 +899,7 @@
           <a:p>
             <a:fld id="{2A84CB3F-E3C1-5B40-88B8-D14386A89107}" type="datetimeFigureOut">
               <a:rPr lang="en-US" smtClean="0"/>
-              <a:t>8/8/25</a:t>
+              <a:t>8/24/25</a:t>
             </a:fld>
             <a:endParaRPr lang="en-US"/>
           </a:p>
@@ -1074,7 +1079,7 @@
           <a:p>
             <a:fld id="{2A84CB3F-E3C1-5B40-88B8-D14386A89107}" type="datetimeFigureOut">
               <a:rPr lang="en-US" smtClean="0"/>
-              <a:t>8/8/25</a:t>
+              <a:t>8/24/25</a:t>
             </a:fld>
             <a:endParaRPr lang="en-US"/>
           </a:p>
@@ -1808,7 +1813,7 @@
           <a:p>
             <a:fld id="{2A84CB3F-E3C1-5B40-88B8-D14386A89107}" type="datetimeFigureOut">
               <a:rPr lang="en-US" smtClean="0"/>
-              <a:t>8/8/25</a:t>
+              <a:t>8/24/25</a:t>
             </a:fld>
             <a:endParaRPr lang="en-US"/>
           </a:p>
@@ -2054,7 +2059,7 @@
           <a:p>
             <a:fld id="{2A84CB3F-E3C1-5B40-88B8-D14386A89107}" type="datetimeFigureOut">
               <a:rPr lang="en-US" smtClean="0"/>
-              <a:t>8/8/25</a:t>
+              <a:t>8/24/25</a:t>
             </a:fld>
             <a:endParaRPr lang="en-US"/>
           </a:p>
@@ -2286,7 +2291,7 @@
           <a:p>
             <a:fld id="{2A84CB3F-E3C1-5B40-88B8-D14386A89107}" type="datetimeFigureOut">
               <a:rPr lang="en-US" smtClean="0"/>
-              <a:t>8/8/25</a:t>
+              <a:t>8/24/25</a:t>
             </a:fld>
             <a:endParaRPr lang="en-US"/>
           </a:p>
@@ -2653,7 +2658,7 @@
           <a:p>
             <a:fld id="{2A84CB3F-E3C1-5B40-88B8-D14386A89107}" type="datetimeFigureOut">
               <a:rPr lang="en-US" smtClean="0"/>
-              <a:t>8/8/25</a:t>
+              <a:t>8/24/25</a:t>
             </a:fld>
             <a:endParaRPr lang="en-US"/>
           </a:p>
@@ -2771,7 +2776,7 @@
           <a:p>
             <a:fld id="{2A84CB3F-E3C1-5B40-88B8-D14386A89107}" type="datetimeFigureOut">
               <a:rPr lang="en-US" smtClean="0"/>
-              <a:t>8/8/25</a:t>
+              <a:t>8/24/25</a:t>
             </a:fld>
             <a:endParaRPr lang="en-US"/>
           </a:p>
@@ -2866,7 +2871,7 @@
           <a:p>
             <a:fld id="{2A84CB3F-E3C1-5B40-88B8-D14386A89107}" type="datetimeFigureOut">
               <a:rPr lang="en-US" smtClean="0"/>
-              <a:t>8/8/25</a:t>
+              <a:t>8/24/25</a:t>
             </a:fld>
             <a:endParaRPr lang="en-US"/>
           </a:p>
@@ -3143,7 +3148,7 @@
           <a:p>
             <a:fld id="{2A84CB3F-E3C1-5B40-88B8-D14386A89107}" type="datetimeFigureOut">
               <a:rPr lang="en-US" smtClean="0"/>
-              <a:t>8/8/25</a:t>
+              <a:t>8/24/25</a:t>
             </a:fld>
             <a:endParaRPr lang="en-US"/>
           </a:p>
@@ -3400,7 +3405,7 @@
           <a:p>
             <a:fld id="{2A84CB3F-E3C1-5B40-88B8-D14386A89107}" type="datetimeFigureOut">
               <a:rPr lang="en-US" smtClean="0"/>
-              <a:t>8/8/25</a:t>
+              <a:t>8/24/25</a:t>
             </a:fld>
             <a:endParaRPr lang="en-US"/>
           </a:p>
@@ -3613,7 +3618,7 @@
           <a:p>
             <a:fld id="{2A84CB3F-E3C1-5B40-88B8-D14386A89107}" type="datetimeFigureOut">
               <a:rPr lang="en-US" smtClean="0"/>
-              <a:t>8/8/25</a:t>
+              <a:t>8/24/25</a:t>
             </a:fld>
             <a:endParaRPr lang="en-US"/>
           </a:p>
@@ -4092,7 +4097,7 @@
                 <a:cs typeface="Cambria"/>
                 <a:sym typeface="Cambria"/>
               </a:rPr>
-              <a:t>Convolutional Nearest Neighbor</a:t>
+              <a:t>Attention via Convolutional Nearest Neighbors</a:t>
             </a:r>
             <a:endParaRPr sz="4018" b="1" dirty="0">
               <a:latin typeface="Cambria"/>
@@ -4414,7 +4419,7 @@
                 <a:cs typeface="Libre Franklin"/>
                 <a:sym typeface="Libre Franklin"/>
               </a:rPr>
-              <a:t>  Individuals with cochlear implants (CIs) and normal hearing (NH) engage in “clustering and switching” during memory search, similar to optimal foraging in the wild. </a:t>
+              <a:t>Individuals with cochlear implants (CIs) and normal hearing (NH) engage in “clustering and switching” during memory search, similar to optimal foraging in the wild. </a:t>
             </a:r>
             <a:endParaRPr sz="2364" dirty="0">
               <a:solidFill>
@@ -4448,7 +4453,7 @@
                 <a:cs typeface="Libre Franklin"/>
                 <a:sym typeface="Libre Franklin"/>
               </a:rPr>
-              <a:t> Semantic and phonological cues influence memory search differently in individuals with cochlear implants (CIs) compared to normal hearing (NH).</a:t>
+              <a:t>Semantic and phonological cues influence memory search differently in individuals with cochlear implants (CIs) compared to normal hearing (NH).</a:t>
             </a:r>
             <a:endParaRPr sz="2364" dirty="0">
               <a:solidFill>
@@ -4482,7 +4487,7 @@
                 <a:cs typeface="Libre Franklin"/>
                 <a:sym typeface="Libre Franklin"/>
               </a:rPr>
-              <a:t> We investigated search in prelingually deaf individuals with CIs to explore the impact of early phonological input on semantic organization and retrieval processes. </a:t>
+              <a:t>We investigated search in prelingually deaf individuals with CIs to explore the impact of early phonological input on semantic organization and retrieval processes. </a:t>
             </a:r>
             <a:endParaRPr sz="2364" dirty="0">
               <a:solidFill>
@@ -4770,10 +4775,16 @@
         <p:nvGraphicFramePr>
           <p:cNvPr id="69" name="Google Shape;69;p14"/>
           <p:cNvGraphicFramePr/>
-          <p:nvPr/>
+          <p:nvPr>
+            <p:extLst>
+              <p:ext uri="{D42A27DB-BD31-4B8C-83A1-F6EECF244321}">
+                <p14:modId xmlns:p14="http://schemas.microsoft.com/office/powerpoint/2010/main" val="2144847423"/>
+              </p:ext>
+            </p:extLst>
+          </p:nvPr>
         </p:nvGraphicFramePr>
         <p:xfrm>
-          <a:off x="425609" y="22877502"/>
+          <a:off x="425609" y="24190963"/>
           <a:ext cx="9308729" cy="8294945"/>
         </p:xfrm>
         <a:graphic>
@@ -4907,7 +4918,7 @@
                         <a:buNone/>
                       </a:pPr>
                       <a:r>
-                        <a:rPr lang="en" sz="2800" b="1">
+                        <a:rPr lang="en" sz="2800" b="1" dirty="0">
                           <a:latin typeface="Libre Franklin"/>
                           <a:ea typeface="Libre Franklin"/>
                           <a:cs typeface="Libre Franklin"/>
@@ -4915,7 +4926,7 @@
                         </a:rPr>
                         <a:t>Mean (Range) in NHs (N=30)</a:t>
                       </a:r>
-                      <a:endParaRPr sz="2800" b="1" u="none" strike="noStrike" cap="none" baseline="-25000">
+                      <a:endParaRPr sz="2800" b="1" u="none" strike="noStrike" cap="none" baseline="-25000" dirty="0">
                         <a:solidFill>
                           <a:srgbClr val="000000"/>
                         </a:solidFill>
@@ -5435,7 +5446,7 @@
                         <a:buNone/>
                       </a:pPr>
                       <a:r>
-                        <a:rPr lang="en" sz="2800" b="1">
+                        <a:rPr lang="en" sz="2800" b="1" dirty="0">
                           <a:latin typeface="Libre Franklin"/>
                           <a:ea typeface="Libre Franklin"/>
                           <a:cs typeface="Libre Franklin"/>
@@ -5444,7 +5455,7 @@
                         <a:t>Standardized PPVT-5</a:t>
                       </a:r>
                       <a:r>
-                        <a:rPr lang="en" sz="2800" b="1" baseline="30000">
+                        <a:rPr lang="en" sz="2800" b="1" baseline="30000" dirty="0">
                           <a:latin typeface="Libre Franklin"/>
                           <a:ea typeface="Libre Franklin"/>
                           <a:cs typeface="Libre Franklin"/>
@@ -5452,7 +5463,7 @@
                         </a:rPr>
                         <a:t>*</a:t>
                       </a:r>
-                      <a:endParaRPr sz="2800" b="1" i="0" u="none" strike="noStrike" cap="none" baseline="30000">
+                      <a:endParaRPr sz="2800" b="1" i="0" u="none" strike="noStrike" cap="none" baseline="30000" dirty="0">
                         <a:solidFill>
                           <a:srgbClr val="000000"/>
                         </a:solidFill>
@@ -5745,62 +5756,13 @@
       </p:sp>
       <p:sp>
         <p:nvSpPr>
-          <p:cNvPr id="75" name="Google Shape;75;p14"/>
-          <p:cNvSpPr/>
-          <p:nvPr/>
-        </p:nvSpPr>
-        <p:spPr>
-          <a:xfrm>
-            <a:off x="425615" y="21753438"/>
-            <a:ext cx="9308709" cy="757782"/>
-          </a:xfrm>
-          <a:prstGeom prst="rect">
-            <a:avLst/>
-          </a:prstGeom>
-          <a:solidFill>
-            <a:schemeClr val="bg2">
-              <a:lumMod val="90000"/>
-            </a:schemeClr>
-          </a:solidFill>
-          <a:ln w="63500" cap="flat" cmpd="sng">
-            <a:solidFill>
-              <a:schemeClr val="dk1"/>
-            </a:solidFill>
-            <a:prstDash val="solid"/>
-            <a:round/>
-            <a:headEnd type="none" w="sm" len="sm"/>
-            <a:tailEnd type="none" w="sm" len="sm"/>
-          </a:ln>
-        </p:spPr>
-        <p:txBody>
-          <a:bodyPr spcFirstLastPara="1" wrap="square" lIns="67265" tIns="33642" rIns="67265" bIns="33642" anchor="ctr" anchorCtr="0">
-            <a:noAutofit/>
-          </a:bodyPr>
-          <a:lstStyle/>
-          <a:p>
-            <a:pPr algn="ctr"/>
-            <a:r>
-              <a:rPr lang="en" sz="3940" b="1" dirty="0">
-                <a:latin typeface="Calibri"/>
-                <a:ea typeface="Calibri"/>
-                <a:cs typeface="Calibri"/>
-                <a:sym typeface="Calibri"/>
-              </a:rPr>
-              <a:t>PARTICIPANTS</a:t>
-            </a:r>
-            <a:endParaRPr sz="788" dirty="0"/>
-          </a:p>
-        </p:txBody>
-      </p:sp>
-      <p:sp>
-        <p:nvSpPr>
           <p:cNvPr id="76" name="Google Shape;76;p14"/>
           <p:cNvSpPr txBox="1"/>
           <p:nvPr/>
         </p:nvSpPr>
         <p:spPr>
           <a:xfrm>
-            <a:off x="55486" y="31328549"/>
+            <a:off x="77014" y="32540270"/>
             <a:ext cx="9678855" cy="1243745"/>
           </a:xfrm>
           <a:prstGeom prst="rect">
@@ -5818,7 +5780,7 @@
           <a:lstStyle/>
           <a:p>
             <a:r>
-              <a:rPr lang="en" sz="1970" i="1">
+              <a:rPr lang="en" sz="1970" i="1" dirty="0">
                 <a:solidFill>
                   <a:schemeClr val="dk2"/>
                 </a:solidFill>
@@ -5830,7 +5792,7 @@
               <a:t>Note</a:t>
             </a:r>
             <a:r>
-              <a:rPr lang="en" sz="1970">
+              <a:rPr lang="en" sz="1970" dirty="0">
                 <a:solidFill>
                   <a:schemeClr val="dk2"/>
                 </a:solidFill>
@@ -5841,7 +5803,7 @@
               </a:rPr>
               <a:t>: PPVT-5 stands for the Peabody Picture Vocabulary Test, a standardized test that measures receptive vocabulary knowledge</a:t>
             </a:r>
-            <a:endParaRPr sz="1970">
+            <a:endParaRPr sz="1970" dirty="0">
               <a:solidFill>
                 <a:schemeClr val="dk2"/>
               </a:solidFill>
@@ -6419,62 +6381,6 @@
           </a:p>
         </p:txBody>
       </p:sp>
-      <p:pic>
-        <p:nvPicPr>
-          <p:cNvPr id="83" name="Google Shape;83;p14"/>
-          <p:cNvPicPr preferRelativeResize="0"/>
-          <p:nvPr/>
-        </p:nvPicPr>
-        <p:blipFill>
-          <a:blip r:embed="rId6">
-            <a:alphaModFix/>
-          </a:blip>
-          <a:stretch>
-            <a:fillRect/>
-          </a:stretch>
-        </p:blipFill>
-        <p:spPr>
-          <a:xfrm>
-            <a:off x="5526537" y="17588376"/>
-            <a:ext cx="3889305" cy="3889283"/>
-          </a:xfrm>
-          <a:prstGeom prst="rect">
-            <a:avLst/>
-          </a:prstGeom>
-          <a:noFill/>
-          <a:ln>
-            <a:noFill/>
-          </a:ln>
-        </p:spPr>
-      </p:pic>
-      <p:pic>
-        <p:nvPicPr>
-          <p:cNvPr id="84" name="Google Shape;84;p14"/>
-          <p:cNvPicPr preferRelativeResize="0"/>
-          <p:nvPr/>
-        </p:nvPicPr>
-        <p:blipFill>
-          <a:blip r:embed="rId7">
-            <a:alphaModFix/>
-          </a:blip>
-          <a:stretch>
-            <a:fillRect/>
-          </a:stretch>
-        </p:blipFill>
-        <p:spPr>
-          <a:xfrm>
-            <a:off x="251471" y="17221677"/>
-            <a:ext cx="5083474" cy="4361145"/>
-          </a:xfrm>
-          <a:prstGeom prst="rect">
-            <a:avLst/>
-          </a:prstGeom>
-          <a:noFill/>
-          <a:ln>
-            <a:noFill/>
-          </a:ln>
-        </p:spPr>
-      </p:pic>
       <p:sp>
         <p:nvSpPr>
           <p:cNvPr id="85" name="Google Shape;85;p14"/>
@@ -6483,7 +6389,7 @@
         </p:nvSpPr>
         <p:spPr>
           <a:xfrm>
-            <a:off x="280367" y="16068656"/>
+            <a:off x="280367" y="17221597"/>
             <a:ext cx="9308709" cy="757782"/>
           </a:xfrm>
           <a:prstGeom prst="rect">
@@ -6518,58 +6424,9 @@
                 <a:cs typeface="Calibri"/>
                 <a:sym typeface="Calibri"/>
               </a:rPr>
-              <a:t>LOCALITY AND SPARSITY</a:t>
+              <a:t>GENERALIZATIONS</a:t>
             </a:r>
             <a:endParaRPr sz="788" dirty="0"/>
-          </a:p>
-        </p:txBody>
-      </p:sp>
-      <p:sp>
-        <p:nvSpPr>
-          <p:cNvPr id="86" name="Google Shape;86;p14"/>
-          <p:cNvSpPr txBox="1"/>
-          <p:nvPr/>
-        </p:nvSpPr>
-        <p:spPr>
-          <a:xfrm>
-            <a:off x="2299286" y="16905108"/>
-            <a:ext cx="6458164" cy="407491"/>
-          </a:xfrm>
-          <a:prstGeom prst="rect">
-            <a:avLst/>
-          </a:prstGeom>
-          <a:noFill/>
-          <a:ln>
-            <a:noFill/>
-          </a:ln>
-        </p:spPr>
-        <p:txBody>
-          <a:bodyPr spcFirstLastPara="1" wrap="square" lIns="72032" tIns="72032" rIns="72032" bIns="72032" anchor="t" anchorCtr="0">
-            <a:noAutofit/>
-          </a:bodyPr>
-          <a:lstStyle/>
-          <a:p>
-            <a:r>
-              <a:rPr lang="en" sz="1418" b="1" u="sng" dirty="0">
-                <a:solidFill>
-                  <a:schemeClr val="dk1"/>
-                </a:solidFill>
-              </a:rPr>
-              <a:t>example</a:t>
-            </a:r>
-            <a:r>
-              <a:rPr lang="en" sz="1418" dirty="0">
-                <a:solidFill>
-                  <a:schemeClr val="dk1"/>
-                </a:solidFill>
-              </a:rPr>
-              <a:t>: dog - cat - pig - cow - chicken - elephant - monkey - fish</a:t>
-            </a:r>
-            <a:endParaRPr sz="1418" dirty="0">
-              <a:solidFill>
-                <a:schemeClr val="dk1"/>
-              </a:solidFill>
-            </a:endParaRPr>
           </a:p>
         </p:txBody>
       </p:sp>
@@ -6588,7 +6445,7 @@
           <p:nvPr/>
         </p:nvPicPr>
         <p:blipFill>
-          <a:blip r:embed="rId8">
+          <a:blip r:embed="rId6">
             <a:extLst>
               <a:ext uri="{28A0092B-C50C-407E-A947-70E740481C1C}">
                 <a14:useLocalDpi xmlns:a14="http://schemas.microsoft.com/office/drawing/2010/main" val="0"/>
@@ -6746,6 +6603,67 @@
           </a:p>
         </p:txBody>
       </p:sp>
+      <p:pic>
+        <p:nvPicPr>
+          <p:cNvPr id="6" name="Picture 5">
+            <a:extLst>
+              <a:ext uri="{FF2B5EF4-FFF2-40B4-BE49-F238E27FC236}">
+                <a16:creationId xmlns:a16="http://schemas.microsoft.com/office/drawing/2014/main" id="{8B332BC5-4E97-CC33-D945-00069E52C3A6}"/>
+              </a:ext>
+            </a:extLst>
+          </p:cNvPr>
+          <p:cNvPicPr>
+            <a:picLocks noChangeAspect="1"/>
+          </p:cNvPicPr>
+          <p:nvPr/>
+        </p:nvPicPr>
+        <p:blipFill>
+          <a:blip r:embed="rId7"/>
+          <a:stretch>
+            <a:fillRect/>
+          </a:stretch>
+        </p:blipFill>
+        <p:spPr>
+          <a:xfrm>
+            <a:off x="425609" y="18203196"/>
+            <a:ext cx="8990250" cy="4285279"/>
+          </a:xfrm>
+          <a:prstGeom prst="rect">
+            <a:avLst/>
+          </a:prstGeom>
+        </p:spPr>
+      </p:pic>
+      <p:pic>
+        <p:nvPicPr>
+          <p:cNvPr id="7" name="Picture 6">
+            <a:extLst>
+              <a:ext uri="{FF2B5EF4-FFF2-40B4-BE49-F238E27FC236}">
+                <a16:creationId xmlns:a16="http://schemas.microsoft.com/office/drawing/2014/main" id="{649A5469-E930-EEC0-7C21-26388B72524B}"/>
+              </a:ext>
+            </a:extLst>
+          </p:cNvPr>
+          <p:cNvPicPr>
+            <a:picLocks noChangeAspect="1"/>
+          </p:cNvPicPr>
+          <p:nvPr/>
+        </p:nvPicPr>
+        <p:blipFill>
+          <a:blip r:embed="rId8"/>
+          <a:srcRect t="3096"/>
+          <a:stretch>
+            <a:fillRect/>
+          </a:stretch>
+        </p:blipFill>
+        <p:spPr>
+          <a:xfrm>
+            <a:off x="95292" y="10669035"/>
+            <a:ext cx="9678855" cy="6516886"/>
+          </a:xfrm>
+          <a:prstGeom prst="rect">
+            <a:avLst/>
+          </a:prstGeom>
+        </p:spPr>
+      </p:pic>
     </p:spTree>
   </p:cSld>
   <p:clrMapOvr>

</xml_diff>

<commit_message>
[Test] Branching N Test
</commit_message>
<xml_diff>
--- a/Project Docs/ConvNN Poster.pptx
+++ b/Project Docs/ConvNN Poster.pptx
@@ -197,7 +197,7 @@
           <a:p>
             <a:fld id="{97F067A0-B807-594B-857C-0B1CA98D0658}" type="datetimeFigureOut">
               <a:rPr lang="en-US" smtClean="0"/>
-              <a:t>8/24/25</a:t>
+              <a:t>9/25/25</a:t>
             </a:fld>
             <a:endParaRPr lang="en-US"/>
           </a:p>
@@ -729,7 +729,7 @@
           <a:p>
             <a:fld id="{2A84CB3F-E3C1-5B40-88B8-D14386A89107}" type="datetimeFigureOut">
               <a:rPr lang="en-US" smtClean="0"/>
-              <a:t>8/24/25</a:t>
+              <a:t>9/25/25</a:t>
             </a:fld>
             <a:endParaRPr lang="en-US"/>
           </a:p>
@@ -899,7 +899,7 @@
           <a:p>
             <a:fld id="{2A84CB3F-E3C1-5B40-88B8-D14386A89107}" type="datetimeFigureOut">
               <a:rPr lang="en-US" smtClean="0"/>
-              <a:t>8/24/25</a:t>
+              <a:t>9/25/25</a:t>
             </a:fld>
             <a:endParaRPr lang="en-US"/>
           </a:p>
@@ -1079,7 +1079,7 @@
           <a:p>
             <a:fld id="{2A84CB3F-E3C1-5B40-88B8-D14386A89107}" type="datetimeFigureOut">
               <a:rPr lang="en-US" smtClean="0"/>
-              <a:t>8/24/25</a:t>
+              <a:t>9/25/25</a:t>
             </a:fld>
             <a:endParaRPr lang="en-US"/>
           </a:p>
@@ -1813,7 +1813,7 @@
           <a:p>
             <a:fld id="{2A84CB3F-E3C1-5B40-88B8-D14386A89107}" type="datetimeFigureOut">
               <a:rPr lang="en-US" smtClean="0"/>
-              <a:t>8/24/25</a:t>
+              <a:t>9/25/25</a:t>
             </a:fld>
             <a:endParaRPr lang="en-US"/>
           </a:p>
@@ -2059,7 +2059,7 @@
           <a:p>
             <a:fld id="{2A84CB3F-E3C1-5B40-88B8-D14386A89107}" type="datetimeFigureOut">
               <a:rPr lang="en-US" smtClean="0"/>
-              <a:t>8/24/25</a:t>
+              <a:t>9/25/25</a:t>
             </a:fld>
             <a:endParaRPr lang="en-US"/>
           </a:p>
@@ -2291,7 +2291,7 @@
           <a:p>
             <a:fld id="{2A84CB3F-E3C1-5B40-88B8-D14386A89107}" type="datetimeFigureOut">
               <a:rPr lang="en-US" smtClean="0"/>
-              <a:t>8/24/25</a:t>
+              <a:t>9/25/25</a:t>
             </a:fld>
             <a:endParaRPr lang="en-US"/>
           </a:p>
@@ -2658,7 +2658,7 @@
           <a:p>
             <a:fld id="{2A84CB3F-E3C1-5B40-88B8-D14386A89107}" type="datetimeFigureOut">
               <a:rPr lang="en-US" smtClean="0"/>
-              <a:t>8/24/25</a:t>
+              <a:t>9/25/25</a:t>
             </a:fld>
             <a:endParaRPr lang="en-US"/>
           </a:p>
@@ -2776,7 +2776,7 @@
           <a:p>
             <a:fld id="{2A84CB3F-E3C1-5B40-88B8-D14386A89107}" type="datetimeFigureOut">
               <a:rPr lang="en-US" smtClean="0"/>
-              <a:t>8/24/25</a:t>
+              <a:t>9/25/25</a:t>
             </a:fld>
             <a:endParaRPr lang="en-US"/>
           </a:p>
@@ -2871,7 +2871,7 @@
           <a:p>
             <a:fld id="{2A84CB3F-E3C1-5B40-88B8-D14386A89107}" type="datetimeFigureOut">
               <a:rPr lang="en-US" smtClean="0"/>
-              <a:t>8/24/25</a:t>
+              <a:t>9/25/25</a:t>
             </a:fld>
             <a:endParaRPr lang="en-US"/>
           </a:p>
@@ -3148,7 +3148,7 @@
           <a:p>
             <a:fld id="{2A84CB3F-E3C1-5B40-88B8-D14386A89107}" type="datetimeFigureOut">
               <a:rPr lang="en-US" smtClean="0"/>
-              <a:t>8/24/25</a:t>
+              <a:t>9/25/25</a:t>
             </a:fld>
             <a:endParaRPr lang="en-US"/>
           </a:p>
@@ -3405,7 +3405,7 @@
           <a:p>
             <a:fld id="{2A84CB3F-E3C1-5B40-88B8-D14386A89107}" type="datetimeFigureOut">
               <a:rPr lang="en-US" smtClean="0"/>
-              <a:t>8/24/25</a:t>
+              <a:t>9/25/25</a:t>
             </a:fld>
             <a:endParaRPr lang="en-US"/>
           </a:p>
@@ -3618,7 +3618,7 @@
           <a:p>
             <a:fld id="{2A84CB3F-E3C1-5B40-88B8-D14386A89107}" type="datetimeFigureOut">
               <a:rPr lang="en-US" smtClean="0"/>
-              <a:t>8/24/25</a:t>
+              <a:t>9/25/25</a:t>
             </a:fld>
             <a:endParaRPr lang="en-US"/>
           </a:p>
@@ -4037,7 +4037,7 @@
         <p:spPr>
           <a:xfrm>
             <a:off x="227304" y="202551"/>
-            <a:ext cx="23324836" cy="2156680"/>
+            <a:ext cx="23324836" cy="2580890"/>
           </a:xfrm>
           <a:prstGeom prst="rect">
             <a:avLst/>
@@ -4091,15 +4091,40 @@
               </a:lnSpc>
             </a:pPr>
             <a:r>
-              <a:rPr lang="en" sz="4018" b="1" dirty="0">
+              <a:rPr lang="en" sz="3600" b="1" dirty="0">
                 <a:latin typeface="Cambria"/>
                 <a:ea typeface="Cambria"/>
                 <a:cs typeface="Cambria"/>
                 <a:sym typeface="Cambria"/>
               </a:rPr>
-              <a:t>Attention via Convolutional Nearest Neighbors</a:t>
-            </a:r>
-            <a:endParaRPr sz="4018" b="1" dirty="0">
+              <a:t>Convolutional Nearest Neighbors:</a:t>
+            </a:r>
+            <a:br>
+              <a:rPr lang="en" sz="3600" b="1" dirty="0">
+                <a:latin typeface="Cambria"/>
+                <a:ea typeface="Cambria"/>
+                <a:cs typeface="Cambria"/>
+                <a:sym typeface="Cambria"/>
+              </a:rPr>
+            </a:br>
+            <a:r>
+              <a:rPr lang="en" sz="3600" b="1" dirty="0">
+                <a:latin typeface="Cambria"/>
+                <a:ea typeface="Cambria"/>
+                <a:cs typeface="Cambria"/>
+                <a:sym typeface="Cambria"/>
+              </a:rPr>
+              <a:t>Reinterpreting Convolution Through K-Nearest Neighbor Selection</a:t>
+            </a:r>
+            <a:br>
+              <a:rPr lang="en" sz="3600" b="1" dirty="0">
+                <a:latin typeface="Cambria"/>
+                <a:ea typeface="Cambria"/>
+                <a:cs typeface="Cambria"/>
+                <a:sym typeface="Cambria"/>
+              </a:rPr>
+            </a:br>
+            <a:endParaRPr sz="3600" b="1" dirty="0">
               <a:latin typeface="Cambria"/>
               <a:ea typeface="Cambria"/>
               <a:cs typeface="Cambria"/>
@@ -4232,7 +4257,7 @@
         </p:nvSpPr>
         <p:spPr>
           <a:xfrm>
-            <a:off x="4588400" y="1115626"/>
+            <a:off x="4597077" y="1620331"/>
             <a:ext cx="14761618" cy="528708"/>
           </a:xfrm>
           <a:prstGeom prst="rect">
@@ -4282,7 +4307,7 @@
         </p:nvSpPr>
         <p:spPr>
           <a:xfrm>
-            <a:off x="4597077" y="1759445"/>
+            <a:off x="4597077" y="2209123"/>
             <a:ext cx="14761618" cy="407393"/>
           </a:xfrm>
           <a:prstGeom prst="rect">
@@ -4332,7 +4357,7 @@
         </p:nvSpPr>
         <p:spPr>
           <a:xfrm>
-            <a:off x="222260" y="2614042"/>
+            <a:off x="222260" y="3045158"/>
             <a:ext cx="9388364" cy="904800"/>
           </a:xfrm>
           <a:prstGeom prst="rect">
@@ -4381,8 +4406,8 @@
         </p:nvSpPr>
         <p:spPr>
           <a:xfrm>
-            <a:off x="280366" y="3754113"/>
-            <a:ext cx="9308709" cy="4488382"/>
+            <a:off x="262087" y="4026506"/>
+            <a:ext cx="9308709" cy="5303220"/>
           </a:xfrm>
           <a:prstGeom prst="rect">
             <a:avLst/>
@@ -4410,7 +4435,7 @@
               <a:buChar char="•"/>
             </a:pPr>
             <a:r>
-              <a:rPr lang="en" sz="2364" dirty="0">
+              <a:rPr lang="en-US" dirty="0">
                 <a:solidFill>
                   <a:schemeClr val="dk1"/>
                 </a:solidFill>
@@ -4419,9 +4444,33 @@
                 <a:cs typeface="Libre Franklin"/>
                 <a:sym typeface="Libre Franklin"/>
               </a:rPr>
-              <a:t>Individuals with cochlear implants (CIs) and normal hearing (NH) engage in “clustering and switching” during memory search, similar to optimal foraging in the wild. </a:t>
-            </a:r>
-            <a:endParaRPr sz="2364" dirty="0">
+              <a:t>Convolutional Nearest Neighbor (</a:t>
+            </a:r>
+            <a:r>
+              <a:rPr lang="en-US" b="1" dirty="0">
+                <a:solidFill>
+                  <a:schemeClr val="dk1"/>
+                </a:solidFill>
+                <a:latin typeface="Libre Franklin"/>
+                <a:ea typeface="Libre Franklin"/>
+                <a:cs typeface="Libre Franklin"/>
+                <a:sym typeface="Libre Franklin"/>
+              </a:rPr>
+              <a:t>ConvNN</a:t>
+            </a:r>
+            <a:r>
+              <a:rPr lang="en-US" dirty="0">
+                <a:solidFill>
+                  <a:schemeClr val="dk1"/>
+                </a:solidFill>
+                <a:latin typeface="Libre Franklin"/>
+                <a:ea typeface="Libre Franklin"/>
+                <a:cs typeface="Libre Franklin"/>
+                <a:sym typeface="Libre Franklin"/>
+              </a:rPr>
+              <a:t>) reinterprets convolution through k-nearest neighbor selection principle</a:t>
+            </a:r>
+            <a:endParaRPr dirty="0">
               <a:solidFill>
                 <a:schemeClr val="dk1"/>
               </a:solidFill>
@@ -4444,7 +4493,7 @@
               <a:buChar char="•"/>
             </a:pPr>
             <a:r>
-              <a:rPr lang="en" sz="2364" dirty="0">
+              <a:rPr lang="en-US" dirty="0">
                 <a:solidFill>
                   <a:schemeClr val="dk1"/>
                 </a:solidFill>
@@ -4453,17 +4502,57 @@
                 <a:cs typeface="Libre Franklin"/>
                 <a:sym typeface="Libre Franklin"/>
               </a:rPr>
-              <a:t>Semantic and phonological cues influence memory search differently in individuals with cochlear implants (CIs) compared to normal hearing (NH).</a:t>
-            </a:r>
-            <a:endParaRPr sz="2364" dirty="0">
-              <a:solidFill>
+              <a:t>Convolution’s neighbor selection is based purely on spatial distance between input features </a:t>
+            </a:r>
+          </a:p>
+          <a:p>
+            <a:pPr marL="650005" lvl="1" indent="-342900" algn="just">
+              <a:lnSpc>
+                <a:spcPct val="135000"/>
+              </a:lnSpc>
+              <a:buClr>
                 <a:schemeClr val="dk1"/>
-              </a:solidFill>
-              <a:latin typeface="Libre Franklin"/>
-              <a:ea typeface="Libre Franklin"/>
-              <a:cs typeface="Libre Franklin"/>
-              <a:sym typeface="Libre Franklin"/>
-            </a:endParaRPr>
+              </a:buClr>
+              <a:buSzPts val="3000"/>
+              <a:buFont typeface="Arial" panose="020B0604020202020204" pitchFamily="34" charset="0"/>
+              <a:buChar char="•"/>
+            </a:pPr>
+            <a:r>
+              <a:rPr lang="en-US" dirty="0">
+                <a:solidFill>
+                  <a:schemeClr val="dk1"/>
+                </a:solidFill>
+                <a:latin typeface="Libre Franklin"/>
+                <a:ea typeface="Libre Franklin"/>
+                <a:cs typeface="Libre Franklin"/>
+                <a:sym typeface="Libre Franklin"/>
+              </a:rPr>
+              <a:t>(</a:t>
+            </a:r>
+            <a:r>
+              <a:rPr lang="en-US" dirty="0" err="1">
+                <a:solidFill>
+                  <a:schemeClr val="dk1"/>
+                </a:solidFill>
+                <a:latin typeface="Libre Franklin"/>
+                <a:ea typeface="Libre Franklin"/>
+                <a:cs typeface="Libre Franklin"/>
+                <a:sym typeface="Libre Franklin"/>
+              </a:rPr>
+              <a:t>e.g</a:t>
+            </a:r>
+            <a:r>
+              <a:rPr lang="en-US" dirty="0">
+                <a:solidFill>
+                  <a:schemeClr val="dk1"/>
+                </a:solidFill>
+                <a:latin typeface="Libre Franklin"/>
+                <a:ea typeface="Libre Franklin"/>
+                <a:cs typeface="Libre Franklin"/>
+                <a:sym typeface="Libre Franklin"/>
+              </a:rPr>
+              <a:t> a 3x3 convolution kernel selects k=9 nearest neighbors surrounding each feature including itself as a neighbor based on Euclidean distance in image coordinates</a:t>
+            </a:r>
           </a:p>
           <a:p>
             <a:pPr marL="192805" indent="-342900" algn="just">
@@ -4478,7 +4567,7 @@
               <a:buChar char="•"/>
             </a:pPr>
             <a:r>
-              <a:rPr lang="en" sz="2364" dirty="0">
+              <a:rPr lang="en-US" dirty="0">
                 <a:solidFill>
                   <a:schemeClr val="dk1"/>
                 </a:solidFill>
@@ -4487,17 +4576,102 @@
                 <a:cs typeface="Libre Franklin"/>
                 <a:sym typeface="Libre Franklin"/>
               </a:rPr>
-              <a:t>We investigated search in prelingually deaf individuals with CIs to explore the impact of early phonological input on semantic organization and retrieval processes. </a:t>
-            </a:r>
-            <a:endParaRPr sz="2364" dirty="0">
-              <a:solidFill>
+              <a:t>Neighbor selection can be based on Euclidean distance in image coordinates, feature-based similarity, or a combination of both. </a:t>
+            </a:r>
+          </a:p>
+          <a:p>
+            <a:pPr marL="192805" indent="-342900" algn="just">
+              <a:lnSpc>
+                <a:spcPct val="135000"/>
+              </a:lnSpc>
+              <a:buClr>
                 <a:schemeClr val="dk1"/>
-              </a:solidFill>
-              <a:latin typeface="Libre Franklin"/>
-              <a:ea typeface="Libre Franklin"/>
-              <a:cs typeface="Libre Franklin"/>
-              <a:sym typeface="Libre Franklin"/>
-            </a:endParaRPr>
+              </a:buClr>
+              <a:buSzPts val="3000"/>
+              <a:buFont typeface="Arial" panose="020B0604020202020204" pitchFamily="34" charset="0"/>
+              <a:buChar char="•"/>
+            </a:pPr>
+            <a:r>
+              <a:rPr lang="en-US" dirty="0">
+                <a:solidFill>
+                  <a:schemeClr val="dk1"/>
+                </a:solidFill>
+                <a:latin typeface="Libre Franklin"/>
+                <a:ea typeface="Libre Franklin"/>
+                <a:cs typeface="Libre Franklin"/>
+                <a:sym typeface="Libre Franklin"/>
+              </a:rPr>
+              <a:t>ConvNN algorithm generalizes neighbor selection in convolutions beyond fixed spatial patterns though </a:t>
+            </a:r>
+          </a:p>
+          <a:p>
+            <a:pPr algn="just">
+              <a:lnSpc>
+                <a:spcPct val="135000"/>
+              </a:lnSpc>
+              <a:buClr>
+                <a:schemeClr val="dk1"/>
+              </a:buClr>
+              <a:buSzPts val="3000"/>
+            </a:pPr>
+            <a:r>
+              <a:rPr lang="en-US" dirty="0">
+                <a:solidFill>
+                  <a:schemeClr val="dk1"/>
+                </a:solidFill>
+                <a:latin typeface="Libre Franklin"/>
+                <a:ea typeface="Libre Franklin"/>
+                <a:cs typeface="Libre Franklin"/>
+                <a:sym typeface="Libre Franklin"/>
+              </a:rPr>
+              <a:t>	1. Similarity Computation</a:t>
+            </a:r>
+          </a:p>
+          <a:p>
+            <a:pPr algn="just">
+              <a:lnSpc>
+                <a:spcPct val="135000"/>
+              </a:lnSpc>
+              <a:buClr>
+                <a:schemeClr val="dk1"/>
+              </a:buClr>
+              <a:buSzPts val="3000"/>
+            </a:pPr>
+            <a:r>
+              <a:rPr lang="en-US" dirty="0">
+                <a:solidFill>
+                  <a:schemeClr val="dk1"/>
+                </a:solidFill>
+                <a:latin typeface="Libre Franklin"/>
+                <a:ea typeface="Libre Franklin"/>
+                <a:cs typeface="Libre Franklin"/>
+                <a:sym typeface="Libre Franklin"/>
+              </a:rPr>
+              <a:t>	2. K-Nearest Neighbor Selection</a:t>
+            </a:r>
+          </a:p>
+          <a:p>
+            <a:pPr algn="just">
+              <a:lnSpc>
+                <a:spcPct val="135000"/>
+              </a:lnSpc>
+              <a:buClr>
+                <a:schemeClr val="dk1"/>
+              </a:buClr>
+              <a:buSzPts val="3000"/>
+            </a:pPr>
+            <a:r>
+              <a:rPr lang="en-US" dirty="0">
+                <a:solidFill>
+                  <a:schemeClr val="dk1"/>
+                </a:solidFill>
+                <a:latin typeface="Libre Franklin"/>
+                <a:ea typeface="Libre Franklin"/>
+                <a:cs typeface="Libre Franklin"/>
+                <a:sym typeface="Libre Franklin"/>
+              </a:rPr>
+              <a:t>	3. Weighted Aggregation</a:t>
+            </a:r>
           </a:p>
         </p:txBody>
       </p:sp>
@@ -4509,7 +4683,7 @@
         </p:nvSpPr>
         <p:spPr>
           <a:xfrm>
-            <a:off x="10299704" y="2614227"/>
+            <a:off x="10272896" y="3093478"/>
             <a:ext cx="13252436" cy="904800"/>
           </a:xfrm>
           <a:prstGeom prst="rect">
@@ -4563,7 +4737,7 @@
         </p:nvSpPr>
         <p:spPr>
           <a:xfrm>
-            <a:off x="10088887" y="20083854"/>
+            <a:off x="11555737" y="17285864"/>
             <a:ext cx="13252436" cy="904800"/>
           </a:xfrm>
           <a:prstGeom prst="rect">
@@ -4771,793 +4945,6 @@
           </a:p>
         </p:txBody>
       </p:sp>
-      <p:graphicFrame>
-        <p:nvGraphicFramePr>
-          <p:cNvPr id="69" name="Google Shape;69;p14"/>
-          <p:cNvGraphicFramePr/>
-          <p:nvPr>
-            <p:extLst>
-              <p:ext uri="{D42A27DB-BD31-4B8C-83A1-F6EECF244321}">
-                <p14:modId xmlns:p14="http://schemas.microsoft.com/office/powerpoint/2010/main" val="2144847423"/>
-              </p:ext>
-            </p:extLst>
-          </p:nvPr>
-        </p:nvGraphicFramePr>
-        <p:xfrm>
-          <a:off x="425609" y="24190963"/>
-          <a:ext cx="9308729" cy="8294945"/>
-        </p:xfrm>
-        <a:graphic>
-          <a:graphicData uri="http://schemas.openxmlformats.org/drawingml/2006/table">
-            <a:tbl>
-              <a:tblPr>
-                <a:noFill/>
-              </a:tblPr>
-              <a:tblGrid>
-                <a:gridCol w="3471670">
-                  <a:extLst>
-                    <a:ext uri="{9D8B030D-6E8A-4147-A177-3AD203B41FA5}">
-                      <a16:colId xmlns:a16="http://schemas.microsoft.com/office/drawing/2014/main" val="20000"/>
-                    </a:ext>
-                  </a:extLst>
-                </a:gridCol>
-                <a:gridCol w="2702641">
-                  <a:extLst>
-                    <a:ext uri="{9D8B030D-6E8A-4147-A177-3AD203B41FA5}">
-                      <a16:colId xmlns:a16="http://schemas.microsoft.com/office/drawing/2014/main" val="20001"/>
-                    </a:ext>
-                  </a:extLst>
-                </a:gridCol>
-                <a:gridCol w="3134418">
-                  <a:extLst>
-                    <a:ext uri="{9D8B030D-6E8A-4147-A177-3AD203B41FA5}">
-                      <a16:colId xmlns:a16="http://schemas.microsoft.com/office/drawing/2014/main" val="20002"/>
-                    </a:ext>
-                  </a:extLst>
-                </a:gridCol>
-              </a:tblGrid>
-              <a:tr h="1539771">
-                <a:tc>
-                  <a:txBody>
-                    <a:bodyPr/>
-                    <a:lstStyle/>
-                    <a:p>
-                      <a:pPr marL="0" marR="0" lvl="0" indent="0" algn="ctr" rtl="0">
-                        <a:spcBef>
-                          <a:spcPts val="0"/>
-                        </a:spcBef>
-                        <a:spcAft>
-                          <a:spcPts val="0"/>
-                        </a:spcAft>
-                        <a:buNone/>
-                      </a:pPr>
-                      <a:r>
-                        <a:rPr lang="en" sz="2800" b="1">
-                          <a:solidFill>
-                            <a:srgbClr val="000000"/>
-                          </a:solidFill>
-                          <a:latin typeface="Libre Franklin"/>
-                          <a:ea typeface="Libre Franklin"/>
-                          <a:cs typeface="Libre Franklin"/>
-                          <a:sym typeface="Libre Franklin"/>
-                        </a:rPr>
-                        <a:t>Variable</a:t>
-                      </a:r>
-                      <a:endParaRPr sz="2800" b="1" i="0" u="none" strike="noStrike" cap="none">
-                        <a:solidFill>
-                          <a:srgbClr val="000000"/>
-                        </a:solidFill>
-                        <a:latin typeface="Libre Franklin"/>
-                        <a:ea typeface="Libre Franklin"/>
-                        <a:cs typeface="Libre Franklin"/>
-                        <a:sym typeface="Libre Franklin"/>
-                      </a:endParaRPr>
-                    </a:p>
-                  </a:txBody>
-                  <a:tcPr marL="4944" marR="4944" marT="8214" marB="0" anchor="ctr">
-                    <a:solidFill>
-                      <a:srgbClr val="CCCCCC"/>
-                    </a:solidFill>
-                  </a:tcPr>
-                </a:tc>
-                <a:tc>
-                  <a:txBody>
-                    <a:bodyPr/>
-                    <a:lstStyle/>
-                    <a:p>
-                      <a:pPr marL="0" marR="0" lvl="0" indent="0" algn="ctr" rtl="0">
-                        <a:spcBef>
-                          <a:spcPts val="0"/>
-                        </a:spcBef>
-                        <a:spcAft>
-                          <a:spcPts val="0"/>
-                        </a:spcAft>
-                        <a:buNone/>
-                      </a:pPr>
-                      <a:r>
-                        <a:rPr lang="en" sz="2800" b="1">
-                          <a:solidFill>
-                            <a:srgbClr val="000000"/>
-                          </a:solidFill>
-                          <a:latin typeface="Libre Franklin"/>
-                          <a:ea typeface="Libre Franklin"/>
-                          <a:cs typeface="Libre Franklin"/>
-                          <a:sym typeface="Libre Franklin"/>
-                        </a:rPr>
-                        <a:t>Mean (Range) in CIs (N = 30)</a:t>
-                      </a:r>
-                      <a:endParaRPr sz="2800" b="1" i="0" u="none" strike="noStrike" cap="none">
-                        <a:solidFill>
-                          <a:srgbClr val="000000"/>
-                        </a:solidFill>
-                        <a:latin typeface="Libre Franklin"/>
-                        <a:ea typeface="Libre Franklin"/>
-                        <a:cs typeface="Libre Franklin"/>
-                        <a:sym typeface="Libre Franklin"/>
-                      </a:endParaRPr>
-                    </a:p>
-                  </a:txBody>
-                  <a:tcPr marL="4944" marR="4944" marT="8214" marB="0" anchor="ctr">
-                    <a:solidFill>
-                      <a:srgbClr val="CCCCCC"/>
-                    </a:solidFill>
-                  </a:tcPr>
-                </a:tc>
-                <a:tc>
-                  <a:txBody>
-                    <a:bodyPr/>
-                    <a:lstStyle/>
-                    <a:p>
-                      <a:pPr marL="0" marR="0" lvl="0" indent="0" algn="ctr" rtl="0">
-                        <a:spcBef>
-                          <a:spcPts val="0"/>
-                        </a:spcBef>
-                        <a:spcAft>
-                          <a:spcPts val="0"/>
-                        </a:spcAft>
-                        <a:buNone/>
-                      </a:pPr>
-                      <a:r>
-                        <a:rPr lang="en" sz="2800" b="1" dirty="0">
-                          <a:latin typeface="Libre Franklin"/>
-                          <a:ea typeface="Libre Franklin"/>
-                          <a:cs typeface="Libre Franklin"/>
-                          <a:sym typeface="Libre Franklin"/>
-                        </a:rPr>
-                        <a:t>Mean (Range) in NHs (N=30)</a:t>
-                      </a:r>
-                      <a:endParaRPr sz="2800" b="1" u="none" strike="noStrike" cap="none" baseline="-25000" dirty="0">
-                        <a:solidFill>
-                          <a:srgbClr val="000000"/>
-                        </a:solidFill>
-                        <a:latin typeface="Libre Franklin"/>
-                        <a:ea typeface="Libre Franklin"/>
-                        <a:cs typeface="Libre Franklin"/>
-                        <a:sym typeface="Libre Franklin"/>
-                      </a:endParaRPr>
-                    </a:p>
-                  </a:txBody>
-                  <a:tcPr marL="4944" marR="4944" marT="8214" marB="0" anchor="ctr">
-                    <a:solidFill>
-                      <a:srgbClr val="CCCCCC"/>
-                    </a:solidFill>
-                  </a:tcPr>
-                </a:tc>
-                <a:extLst>
-                  <a:ext uri="{0D108BD9-81ED-4DB2-BD59-A6C34878D82A}">
-                    <a16:rowId xmlns:a16="http://schemas.microsoft.com/office/drawing/2014/main" val="10000"/>
-                  </a:ext>
-                </a:extLst>
-              </a:tr>
-              <a:tr h="1329309">
-                <a:tc>
-                  <a:txBody>
-                    <a:bodyPr/>
-                    <a:lstStyle/>
-                    <a:p>
-                      <a:pPr marL="0" marR="0" lvl="0" indent="0" algn="ctr" rtl="0">
-                        <a:spcBef>
-                          <a:spcPts val="0"/>
-                        </a:spcBef>
-                        <a:spcAft>
-                          <a:spcPts val="0"/>
-                        </a:spcAft>
-                        <a:buNone/>
-                      </a:pPr>
-                      <a:r>
-                        <a:rPr lang="en" sz="2800" b="1">
-                          <a:latin typeface="Libre Franklin"/>
-                          <a:ea typeface="Libre Franklin"/>
-                          <a:cs typeface="Libre Franklin"/>
-                          <a:sym typeface="Libre Franklin"/>
-                        </a:rPr>
-                        <a:t>Chronological age (Years)</a:t>
-                      </a:r>
-                      <a:endParaRPr sz="2800" b="1" i="0" u="none" strike="noStrike" cap="none">
-                        <a:solidFill>
-                          <a:srgbClr val="000000"/>
-                        </a:solidFill>
-                        <a:latin typeface="Libre Franklin"/>
-                        <a:ea typeface="Libre Franklin"/>
-                        <a:cs typeface="Libre Franklin"/>
-                        <a:sym typeface="Libre Franklin"/>
-                      </a:endParaRPr>
-                    </a:p>
-                  </a:txBody>
-                  <a:tcPr marL="4944" marR="4944" marT="8214" marB="0" anchor="ctr"/>
-                </a:tc>
-                <a:tc>
-                  <a:txBody>
-                    <a:bodyPr/>
-                    <a:lstStyle/>
-                    <a:p>
-                      <a:pPr marL="0" marR="0" lvl="0" indent="0" algn="ctr" rtl="0">
-                        <a:spcBef>
-                          <a:spcPts val="0"/>
-                        </a:spcBef>
-                        <a:spcAft>
-                          <a:spcPts val="0"/>
-                        </a:spcAft>
-                        <a:buNone/>
-                      </a:pPr>
-                      <a:r>
-                        <a:rPr lang="en" sz="2700">
-                          <a:latin typeface="Libre Franklin"/>
-                          <a:ea typeface="Libre Franklin"/>
-                          <a:cs typeface="Libre Franklin"/>
-                          <a:sym typeface="Libre Franklin"/>
-                        </a:rPr>
-                        <a:t>15.74 (9.86-26.66)</a:t>
-                      </a:r>
-                      <a:endParaRPr sz="2700" b="0" i="0" u="none" strike="noStrike" cap="none" dirty="0">
-                        <a:solidFill>
-                          <a:srgbClr val="000000"/>
-                        </a:solidFill>
-                        <a:latin typeface="Libre Franklin"/>
-                        <a:ea typeface="Libre Franklin"/>
-                        <a:cs typeface="Libre Franklin"/>
-                        <a:sym typeface="Libre Franklin"/>
-                      </a:endParaRPr>
-                    </a:p>
-                  </a:txBody>
-                  <a:tcPr marL="4944" marR="4944" marT="8214" marB="0" anchor="ctr"/>
-                </a:tc>
-                <a:tc>
-                  <a:txBody>
-                    <a:bodyPr/>
-                    <a:lstStyle/>
-                    <a:p>
-                      <a:pPr marL="0" marR="0" lvl="0" indent="0" algn="ctr" rtl="0">
-                        <a:spcBef>
-                          <a:spcPts val="0"/>
-                        </a:spcBef>
-                        <a:spcAft>
-                          <a:spcPts val="0"/>
-                        </a:spcAft>
-                        <a:buNone/>
-                      </a:pPr>
-                      <a:r>
-                        <a:rPr lang="en" sz="2700">
-                          <a:latin typeface="Libre Franklin"/>
-                          <a:ea typeface="Libre Franklin"/>
-                          <a:cs typeface="Libre Franklin"/>
-                          <a:sym typeface="Libre Franklin"/>
-                        </a:rPr>
-                        <a:t>16.18 (10.2-27.07)</a:t>
-                      </a:r>
-                      <a:endParaRPr sz="2700" b="0" i="0" u="none" strike="noStrike" cap="none">
-                        <a:solidFill>
-                          <a:srgbClr val="000000"/>
-                        </a:solidFill>
-                        <a:latin typeface="Libre Franklin"/>
-                        <a:ea typeface="Libre Franklin"/>
-                        <a:cs typeface="Libre Franklin"/>
-                        <a:sym typeface="Libre Franklin"/>
-                      </a:endParaRPr>
-                    </a:p>
-                  </a:txBody>
-                  <a:tcPr marL="4944" marR="4944" marT="8214" marB="0" anchor="ctr"/>
-                </a:tc>
-                <a:extLst>
-                  <a:ext uri="{0D108BD9-81ED-4DB2-BD59-A6C34878D82A}">
-                    <a16:rowId xmlns:a16="http://schemas.microsoft.com/office/drawing/2014/main" val="10001"/>
-                  </a:ext>
-                </a:extLst>
-              </a:tr>
-              <a:tr h="1662483">
-                <a:tc>
-                  <a:txBody>
-                    <a:bodyPr/>
-                    <a:lstStyle/>
-                    <a:p>
-                      <a:pPr marL="0" marR="0" lvl="0" indent="0" algn="ctr" rtl="0">
-                        <a:spcBef>
-                          <a:spcPts val="0"/>
-                        </a:spcBef>
-                        <a:spcAft>
-                          <a:spcPts val="0"/>
-                        </a:spcAft>
-                        <a:buNone/>
-                      </a:pPr>
-                      <a:r>
-                        <a:rPr lang="en" sz="2800" b="1">
-                          <a:solidFill>
-                            <a:srgbClr val="000000"/>
-                          </a:solidFill>
-                          <a:latin typeface="Libre Franklin"/>
-                          <a:ea typeface="Libre Franklin"/>
-                          <a:cs typeface="Libre Franklin"/>
-                          <a:sym typeface="Libre Franklin"/>
-                        </a:rPr>
-                        <a:t>Age at implementation (months)</a:t>
-                      </a:r>
-                      <a:r>
-                        <a:rPr lang="en" sz="2800" b="1" i="0" u="none" strike="noStrike" cap="none">
-                          <a:solidFill>
-                            <a:srgbClr val="000000"/>
-                          </a:solidFill>
-                          <a:latin typeface="Libre Franklin"/>
-                          <a:ea typeface="Libre Franklin"/>
-                          <a:cs typeface="Libre Franklin"/>
-                          <a:sym typeface="Libre Franklin"/>
-                        </a:rPr>
-                        <a:t>        </a:t>
-                      </a:r>
-                      <a:endParaRPr sz="2800" b="1" i="0" u="none" strike="noStrike" cap="none">
-                        <a:solidFill>
-                          <a:srgbClr val="000000"/>
-                        </a:solidFill>
-                        <a:latin typeface="Libre Franklin"/>
-                        <a:ea typeface="Libre Franklin"/>
-                        <a:cs typeface="Libre Franklin"/>
-                        <a:sym typeface="Libre Franklin"/>
-                      </a:endParaRPr>
-                    </a:p>
-                  </a:txBody>
-                  <a:tcPr marL="4944" marR="4944" marT="8214" marB="0" anchor="ctr"/>
-                </a:tc>
-                <a:tc>
-                  <a:txBody>
-                    <a:bodyPr/>
-                    <a:lstStyle/>
-                    <a:p>
-                      <a:pPr marL="0" marR="0" lvl="0" indent="0" algn="ctr" rtl="0">
-                        <a:spcBef>
-                          <a:spcPts val="0"/>
-                        </a:spcBef>
-                        <a:spcAft>
-                          <a:spcPts val="0"/>
-                        </a:spcAft>
-                        <a:buNone/>
-                      </a:pPr>
-                      <a:r>
-                        <a:rPr lang="en" sz="2700">
-                          <a:solidFill>
-                            <a:srgbClr val="000000"/>
-                          </a:solidFill>
-                          <a:latin typeface="Libre Franklin"/>
-                          <a:ea typeface="Libre Franklin"/>
-                          <a:cs typeface="Libre Franklin"/>
-                          <a:sym typeface="Libre Franklin"/>
-                        </a:rPr>
-                        <a:t>37.94 (11.07-75.76)</a:t>
-                      </a:r>
-                      <a:endParaRPr sz="2700" b="0" i="0" u="none" strike="noStrike" cap="none">
-                        <a:solidFill>
-                          <a:srgbClr val="000000"/>
-                        </a:solidFill>
-                        <a:latin typeface="Libre Franklin"/>
-                        <a:ea typeface="Libre Franklin"/>
-                        <a:cs typeface="Libre Franklin"/>
-                        <a:sym typeface="Libre Franklin"/>
-                      </a:endParaRPr>
-                    </a:p>
-                  </a:txBody>
-                  <a:tcPr marL="4944" marR="4944" marT="8214" marB="0" anchor="ctr"/>
-                </a:tc>
-                <a:tc>
-                  <a:txBody>
-                    <a:bodyPr/>
-                    <a:lstStyle/>
-                    <a:p>
-                      <a:pPr marL="0" marR="0" lvl="0" indent="0" algn="ctr" rtl="0">
-                        <a:spcBef>
-                          <a:spcPts val="0"/>
-                        </a:spcBef>
-                        <a:spcAft>
-                          <a:spcPts val="0"/>
-                        </a:spcAft>
-                        <a:buNone/>
-                      </a:pPr>
-                      <a:r>
-                        <a:rPr lang="en" sz="2600">
-                          <a:latin typeface="Libre Franklin"/>
-                          <a:ea typeface="Libre Franklin"/>
-                          <a:cs typeface="Libre Franklin"/>
-                          <a:sym typeface="Libre Franklin"/>
-                        </a:rPr>
-                        <a:t>-</a:t>
-                      </a:r>
-                      <a:endParaRPr sz="2800" b="0" i="0" u="none" strike="noStrike" cap="none">
-                        <a:solidFill>
-                          <a:srgbClr val="000000"/>
-                        </a:solidFill>
-                        <a:latin typeface="Libre Franklin"/>
-                        <a:ea typeface="Libre Franklin"/>
-                        <a:cs typeface="Libre Franklin"/>
-                        <a:sym typeface="Libre Franklin"/>
-                      </a:endParaRPr>
-                    </a:p>
-                  </a:txBody>
-                  <a:tcPr marL="4944" marR="4944" marT="8214" marB="0" anchor="ctr"/>
-                </a:tc>
-                <a:extLst>
-                  <a:ext uri="{0D108BD9-81ED-4DB2-BD59-A6C34878D82A}">
-                    <a16:rowId xmlns:a16="http://schemas.microsoft.com/office/drawing/2014/main" val="10002"/>
-                  </a:ext>
-                </a:extLst>
-              </a:tr>
-              <a:tr h="1206794">
-                <a:tc>
-                  <a:txBody>
-                    <a:bodyPr/>
-                    <a:lstStyle/>
-                    <a:p>
-                      <a:pPr marL="0" marR="0" lvl="0" indent="0" algn="ctr" rtl="0">
-                        <a:spcBef>
-                          <a:spcPts val="0"/>
-                        </a:spcBef>
-                        <a:spcAft>
-                          <a:spcPts val="0"/>
-                        </a:spcAft>
-                        <a:buNone/>
-                      </a:pPr>
-                      <a:r>
-                        <a:rPr lang="en" sz="2800" b="1">
-                          <a:latin typeface="Libre Franklin"/>
-                          <a:ea typeface="Libre Franklin"/>
-                          <a:cs typeface="Libre Franklin"/>
-                          <a:sym typeface="Libre Franklin"/>
-                        </a:rPr>
-                        <a:t>Duration of CI use (Years)</a:t>
-                      </a:r>
-                      <a:endParaRPr sz="2800" b="1" i="0" u="none" strike="noStrike" cap="none">
-                        <a:solidFill>
-                          <a:srgbClr val="000000"/>
-                        </a:solidFill>
-                        <a:latin typeface="Libre Franklin"/>
-                        <a:ea typeface="Libre Franklin"/>
-                        <a:cs typeface="Libre Franklin"/>
-                        <a:sym typeface="Libre Franklin"/>
-                      </a:endParaRPr>
-                    </a:p>
-                  </a:txBody>
-                  <a:tcPr marL="4944" marR="4944" marT="8214" marB="0" anchor="ctr"/>
-                </a:tc>
-                <a:tc>
-                  <a:txBody>
-                    <a:bodyPr/>
-                    <a:lstStyle/>
-                    <a:p>
-                      <a:pPr marL="0" marR="0" lvl="0" indent="0" algn="ctr" rtl="0">
-                        <a:spcBef>
-                          <a:spcPts val="0"/>
-                        </a:spcBef>
-                        <a:spcAft>
-                          <a:spcPts val="0"/>
-                        </a:spcAft>
-                        <a:buNone/>
-                      </a:pPr>
-                      <a:r>
-                        <a:rPr lang="en" sz="2700">
-                          <a:latin typeface="Libre Franklin"/>
-                          <a:ea typeface="Libre Franklin"/>
-                          <a:cs typeface="Libre Franklin"/>
-                          <a:sym typeface="Libre Franklin"/>
-                        </a:rPr>
-                        <a:t>12.58 (7.79-21.19)</a:t>
-                      </a:r>
-                      <a:endParaRPr sz="2700" b="0" i="0" u="none" strike="noStrike" cap="none">
-                        <a:solidFill>
-                          <a:srgbClr val="000000"/>
-                        </a:solidFill>
-                        <a:latin typeface="Libre Franklin"/>
-                        <a:ea typeface="Libre Franklin"/>
-                        <a:cs typeface="Libre Franklin"/>
-                        <a:sym typeface="Libre Franklin"/>
-                      </a:endParaRPr>
-                    </a:p>
-                  </a:txBody>
-                  <a:tcPr marL="4944" marR="4944" marT="8214" marB="0" anchor="ctr"/>
-                </a:tc>
-                <a:tc>
-                  <a:txBody>
-                    <a:bodyPr/>
-                    <a:lstStyle/>
-                    <a:p>
-                      <a:pPr marL="0" marR="0" lvl="0" indent="0" algn="ctr" rtl="0">
-                        <a:spcBef>
-                          <a:spcPts val="0"/>
-                        </a:spcBef>
-                        <a:spcAft>
-                          <a:spcPts val="0"/>
-                        </a:spcAft>
-                        <a:buNone/>
-                      </a:pPr>
-                      <a:r>
-                        <a:rPr lang="en" sz="2500">
-                          <a:latin typeface="Libre Franklin"/>
-                          <a:ea typeface="Libre Franklin"/>
-                          <a:cs typeface="Libre Franklin"/>
-                          <a:sym typeface="Libre Franklin"/>
-                        </a:rPr>
-                        <a:t>-</a:t>
-                      </a:r>
-                      <a:endParaRPr sz="2700" b="0" i="0" u="none" strike="noStrike" cap="none">
-                        <a:solidFill>
-                          <a:srgbClr val="000000"/>
-                        </a:solidFill>
-                        <a:latin typeface="Libre Franklin"/>
-                        <a:ea typeface="Libre Franklin"/>
-                        <a:cs typeface="Libre Franklin"/>
-                        <a:sym typeface="Libre Franklin"/>
-                      </a:endParaRPr>
-                    </a:p>
-                  </a:txBody>
-                  <a:tcPr marL="4944" marR="4944" marT="8214" marB="0" anchor="ctr"/>
-                </a:tc>
-                <a:extLst>
-                  <a:ext uri="{0D108BD9-81ED-4DB2-BD59-A6C34878D82A}">
-                    <a16:rowId xmlns:a16="http://schemas.microsoft.com/office/drawing/2014/main" val="10003"/>
-                  </a:ext>
-                </a:extLst>
-              </a:tr>
-              <a:tr h="1503253">
-                <a:tc>
-                  <a:txBody>
-                    <a:bodyPr/>
-                    <a:lstStyle/>
-                    <a:p>
-                      <a:pPr marL="0" marR="0" lvl="0" indent="0" algn="ctr" rtl="0">
-                        <a:spcBef>
-                          <a:spcPts val="0"/>
-                        </a:spcBef>
-                        <a:spcAft>
-                          <a:spcPts val="0"/>
-                        </a:spcAft>
-                        <a:buNone/>
-                      </a:pPr>
-                      <a:r>
-                        <a:rPr lang="en" sz="2800" b="1">
-                          <a:solidFill>
-                            <a:srgbClr val="000000"/>
-                          </a:solidFill>
-                          <a:latin typeface="Libre Franklin"/>
-                          <a:ea typeface="Libre Franklin"/>
-                          <a:cs typeface="Libre Franklin"/>
-                          <a:sym typeface="Libre Franklin"/>
-                        </a:rPr>
-                        <a:t>Age of onset of deafness (months)</a:t>
-                      </a:r>
-                      <a:endParaRPr sz="2800" b="1" i="0" u="none" strike="noStrike" cap="none">
-                        <a:solidFill>
-                          <a:srgbClr val="000000"/>
-                        </a:solidFill>
-                        <a:latin typeface="Libre Franklin"/>
-                        <a:ea typeface="Libre Franklin"/>
-                        <a:cs typeface="Libre Franklin"/>
-                        <a:sym typeface="Libre Franklin"/>
-                      </a:endParaRPr>
-                    </a:p>
-                  </a:txBody>
-                  <a:tcPr marL="4944" marR="4944" marT="8214" marB="0" anchor="ctr"/>
-                </a:tc>
-                <a:tc>
-                  <a:txBody>
-                    <a:bodyPr/>
-                    <a:lstStyle/>
-                    <a:p>
-                      <a:pPr marL="0" marR="0" lvl="0" indent="0" algn="ctr" rtl="0">
-                        <a:spcBef>
-                          <a:spcPts val="0"/>
-                        </a:spcBef>
-                        <a:spcAft>
-                          <a:spcPts val="0"/>
-                        </a:spcAft>
-                        <a:buNone/>
-                      </a:pPr>
-                      <a:r>
-                        <a:rPr lang="en" sz="2700">
-                          <a:latin typeface="Libre Franklin"/>
-                          <a:ea typeface="Libre Franklin"/>
-                          <a:cs typeface="Libre Franklin"/>
-                          <a:sym typeface="Libre Franklin"/>
-                        </a:rPr>
-                        <a:t>2.41 (0-24)</a:t>
-                      </a:r>
-                      <a:endParaRPr sz="2700" b="0" i="0" u="none" strike="noStrike" cap="none">
-                        <a:solidFill>
-                          <a:srgbClr val="000000"/>
-                        </a:solidFill>
-                        <a:latin typeface="Libre Franklin"/>
-                        <a:ea typeface="Libre Franklin"/>
-                        <a:cs typeface="Libre Franklin"/>
-                        <a:sym typeface="Libre Franklin"/>
-                      </a:endParaRPr>
-                    </a:p>
-                  </a:txBody>
-                  <a:tcPr marL="4944" marR="4944" marT="8214" marB="0" anchor="ctr"/>
-                </a:tc>
-                <a:tc>
-                  <a:txBody>
-                    <a:bodyPr/>
-                    <a:lstStyle/>
-                    <a:p>
-                      <a:pPr marL="0" marR="0" lvl="0" indent="0" algn="ctr" rtl="0">
-                        <a:spcBef>
-                          <a:spcPts val="0"/>
-                        </a:spcBef>
-                        <a:spcAft>
-                          <a:spcPts val="0"/>
-                        </a:spcAft>
-                        <a:buNone/>
-                      </a:pPr>
-                      <a:r>
-                        <a:rPr lang="en" sz="2500">
-                          <a:latin typeface="Libre Franklin"/>
-                          <a:ea typeface="Libre Franklin"/>
-                          <a:cs typeface="Libre Franklin"/>
-                          <a:sym typeface="Libre Franklin"/>
-                        </a:rPr>
-                        <a:t>-</a:t>
-                      </a:r>
-                      <a:endParaRPr sz="2700" b="0" i="0" u="none" strike="noStrike" cap="none">
-                        <a:solidFill>
-                          <a:srgbClr val="000000"/>
-                        </a:solidFill>
-                        <a:latin typeface="Libre Franklin"/>
-                        <a:ea typeface="Libre Franklin"/>
-                        <a:cs typeface="Libre Franklin"/>
-                        <a:sym typeface="Libre Franklin"/>
-                      </a:endParaRPr>
-                    </a:p>
-                  </a:txBody>
-                  <a:tcPr marL="4944" marR="4944" marT="8214" marB="0" anchor="ctr"/>
-                </a:tc>
-                <a:extLst>
-                  <a:ext uri="{0D108BD9-81ED-4DB2-BD59-A6C34878D82A}">
-                    <a16:rowId xmlns:a16="http://schemas.microsoft.com/office/drawing/2014/main" val="10004"/>
-                  </a:ext>
-                </a:extLst>
-              </a:tr>
-              <a:tr h="1053335">
-                <a:tc>
-                  <a:txBody>
-                    <a:bodyPr/>
-                    <a:lstStyle/>
-                    <a:p>
-                      <a:pPr marL="0" marR="0" lvl="0" indent="0" algn="ctr" rtl="0">
-                        <a:spcBef>
-                          <a:spcPts val="0"/>
-                        </a:spcBef>
-                        <a:spcAft>
-                          <a:spcPts val="0"/>
-                        </a:spcAft>
-                        <a:buNone/>
-                      </a:pPr>
-                      <a:r>
-                        <a:rPr lang="en" sz="2800" b="1" dirty="0">
-                          <a:latin typeface="Libre Franklin"/>
-                          <a:ea typeface="Libre Franklin"/>
-                          <a:cs typeface="Libre Franklin"/>
-                          <a:sym typeface="Libre Franklin"/>
-                        </a:rPr>
-                        <a:t>Standardized PPVT-5</a:t>
-                      </a:r>
-                      <a:r>
-                        <a:rPr lang="en" sz="2800" b="1" baseline="30000" dirty="0">
-                          <a:latin typeface="Libre Franklin"/>
-                          <a:ea typeface="Libre Franklin"/>
-                          <a:cs typeface="Libre Franklin"/>
-                          <a:sym typeface="Libre Franklin"/>
-                        </a:rPr>
-                        <a:t>*</a:t>
-                      </a:r>
-                      <a:endParaRPr sz="2800" b="1" i="0" u="none" strike="noStrike" cap="none" baseline="30000" dirty="0">
-                        <a:solidFill>
-                          <a:srgbClr val="000000"/>
-                        </a:solidFill>
-                        <a:latin typeface="Libre Franklin"/>
-                        <a:ea typeface="Libre Franklin"/>
-                        <a:cs typeface="Libre Franklin"/>
-                        <a:sym typeface="Libre Franklin"/>
-                      </a:endParaRPr>
-                    </a:p>
-                  </a:txBody>
-                  <a:tcPr marL="4944" marR="4944" marT="8214" marB="0" anchor="ctr"/>
-                </a:tc>
-                <a:tc>
-                  <a:txBody>
-                    <a:bodyPr/>
-                    <a:lstStyle/>
-                    <a:p>
-                      <a:pPr marL="0" marR="0" lvl="0" indent="0" algn="ctr" rtl="0">
-                        <a:spcBef>
-                          <a:spcPts val="0"/>
-                        </a:spcBef>
-                        <a:spcAft>
-                          <a:spcPts val="0"/>
-                        </a:spcAft>
-                        <a:buNone/>
-                      </a:pPr>
-                      <a:r>
-                        <a:rPr lang="en" sz="2700">
-                          <a:latin typeface="Libre Franklin"/>
-                          <a:ea typeface="Libre Franklin"/>
-                          <a:cs typeface="Libre Franklin"/>
-                          <a:sym typeface="Libre Franklin"/>
-                        </a:rPr>
-                        <a:t>84.69 (42-123)</a:t>
-                      </a:r>
-                      <a:endParaRPr sz="2700" b="0" i="0" u="none" strike="noStrike" cap="none">
-                        <a:solidFill>
-                          <a:srgbClr val="000000"/>
-                        </a:solidFill>
-                        <a:latin typeface="Libre Franklin"/>
-                        <a:ea typeface="Libre Franklin"/>
-                        <a:cs typeface="Libre Franklin"/>
-                        <a:sym typeface="Libre Franklin"/>
-                      </a:endParaRPr>
-                    </a:p>
-                  </a:txBody>
-                  <a:tcPr marL="4944" marR="4944" marT="8214" marB="0" anchor="ctr"/>
-                </a:tc>
-                <a:tc>
-                  <a:txBody>
-                    <a:bodyPr/>
-                    <a:lstStyle/>
-                    <a:p>
-                      <a:pPr marL="0" marR="0" lvl="0" indent="0" algn="ctr" rtl="0">
-                        <a:spcBef>
-                          <a:spcPts val="0"/>
-                        </a:spcBef>
-                        <a:spcAft>
-                          <a:spcPts val="0"/>
-                        </a:spcAft>
-                        <a:buNone/>
-                      </a:pPr>
-                      <a:r>
-                        <a:rPr lang="en" sz="2700" dirty="0">
-                          <a:latin typeface="Libre Franklin"/>
-                          <a:ea typeface="Libre Franklin"/>
-                          <a:cs typeface="Libre Franklin"/>
-                          <a:sym typeface="Libre Franklin"/>
-                        </a:rPr>
-                        <a:t>108.63 (79-132)</a:t>
-                      </a:r>
-                      <a:endParaRPr sz="2700" b="0" i="0" u="none" strike="noStrike" cap="none" dirty="0">
-                        <a:solidFill>
-                          <a:srgbClr val="000000"/>
-                        </a:solidFill>
-                        <a:latin typeface="Libre Franklin"/>
-                        <a:ea typeface="Libre Franklin"/>
-                        <a:cs typeface="Libre Franklin"/>
-                        <a:sym typeface="Libre Franklin"/>
-                      </a:endParaRPr>
-                    </a:p>
-                  </a:txBody>
-                  <a:tcPr marL="4944" marR="4944" marT="8214" marB="0" anchor="ctr"/>
-                </a:tc>
-                <a:extLst>
-                  <a:ext uri="{0D108BD9-81ED-4DB2-BD59-A6C34878D82A}">
-                    <a16:rowId xmlns:a16="http://schemas.microsoft.com/office/drawing/2014/main" val="10005"/>
-                  </a:ext>
-                </a:extLst>
-              </a:tr>
-            </a:tbl>
-          </a:graphicData>
-        </a:graphic>
-      </p:graphicFrame>
       <p:sp>
         <p:nvSpPr>
           <p:cNvPr id="70" name="Google Shape;70;p14"/>
@@ -5694,8 +5081,8 @@
         </p:blipFill>
         <p:spPr>
           <a:xfrm>
-            <a:off x="21389747" y="353492"/>
-            <a:ext cx="1828800" cy="1828800"/>
+            <a:off x="21112252" y="455868"/>
+            <a:ext cx="2087245" cy="2087245"/>
           </a:xfrm>
           <a:prstGeom prst="rect">
             <a:avLst/>
@@ -5714,7 +5101,7 @@
         </p:nvSpPr>
         <p:spPr>
           <a:xfrm>
-            <a:off x="280366" y="9807988"/>
+            <a:off x="280366" y="9350791"/>
             <a:ext cx="9308709" cy="757782"/>
           </a:xfrm>
           <a:prstGeom prst="rect">
@@ -5754,95 +5141,6 @@
           </a:p>
         </p:txBody>
       </p:sp>
-      <p:sp>
-        <p:nvSpPr>
-          <p:cNvPr id="76" name="Google Shape;76;p14"/>
-          <p:cNvSpPr txBox="1"/>
-          <p:nvPr/>
-        </p:nvSpPr>
-        <p:spPr>
-          <a:xfrm>
-            <a:off x="77014" y="32540270"/>
-            <a:ext cx="9678855" cy="1243745"/>
-          </a:xfrm>
-          <a:prstGeom prst="rect">
-            <a:avLst/>
-          </a:prstGeom>
-          <a:noFill/>
-          <a:ln>
-            <a:noFill/>
-          </a:ln>
-        </p:spPr>
-        <p:txBody>
-          <a:bodyPr spcFirstLastPara="1" wrap="square" lIns="361755" tIns="361755" rIns="361755" bIns="361755" anchor="t" anchorCtr="0">
-            <a:noAutofit/>
-          </a:bodyPr>
-          <a:lstStyle/>
-          <a:p>
-            <a:r>
-              <a:rPr lang="en" sz="1970" i="1" dirty="0">
-                <a:solidFill>
-                  <a:schemeClr val="dk2"/>
-                </a:solidFill>
-                <a:latin typeface="Libre Franklin"/>
-                <a:ea typeface="Libre Franklin"/>
-                <a:cs typeface="Libre Franklin"/>
-                <a:sym typeface="Libre Franklin"/>
-              </a:rPr>
-              <a:t>Note</a:t>
-            </a:r>
-            <a:r>
-              <a:rPr lang="en" sz="1970" dirty="0">
-                <a:solidFill>
-                  <a:schemeClr val="dk2"/>
-                </a:solidFill>
-                <a:latin typeface="Libre Franklin"/>
-                <a:ea typeface="Libre Franklin"/>
-                <a:cs typeface="Libre Franklin"/>
-                <a:sym typeface="Libre Franklin"/>
-              </a:rPr>
-              <a:t>: PPVT-5 stands for the Peabody Picture Vocabulary Test, a standardized test that measures receptive vocabulary knowledge</a:t>
-            </a:r>
-            <a:endParaRPr sz="1970" dirty="0">
-              <a:solidFill>
-                <a:schemeClr val="dk2"/>
-              </a:solidFill>
-              <a:latin typeface="Libre Franklin"/>
-              <a:ea typeface="Libre Franklin"/>
-              <a:cs typeface="Libre Franklin"/>
-              <a:sym typeface="Libre Franklin"/>
-            </a:endParaRPr>
-          </a:p>
-        </p:txBody>
-      </p:sp>
-      <p:pic>
-        <p:nvPicPr>
-          <p:cNvPr id="77" name="Google Shape;77;p14"/>
-          <p:cNvPicPr preferRelativeResize="0"/>
-          <p:nvPr/>
-        </p:nvPicPr>
-        <p:blipFill>
-          <a:blip r:embed="rId4">
-            <a:alphaModFix/>
-          </a:blip>
-          <a:stretch>
-            <a:fillRect/>
-          </a:stretch>
-        </p:blipFill>
-        <p:spPr>
-          <a:xfrm>
-            <a:off x="10758377" y="5691584"/>
-            <a:ext cx="11754383" cy="7834291"/>
-          </a:xfrm>
-          <a:prstGeom prst="rect">
-            <a:avLst/>
-          </a:prstGeom>
-          <a:noFill/>
-          <a:ln>
-            <a:noFill/>
-          </a:ln>
-        </p:spPr>
-      </p:pic>
       <p:pic>
         <p:nvPicPr>
           <p:cNvPr id="78" name="Google Shape;78;p14"/>
@@ -5850,7 +5148,7 @@
           <p:nvPr/>
         </p:nvPicPr>
         <p:blipFill>
-          <a:blip r:embed="rId5">
+          <a:blip r:embed="rId4">
             <a:alphaModFix/>
           </a:blip>
           <a:stretch>
@@ -5879,8 +5177,8 @@
         </p:nvSpPr>
         <p:spPr>
           <a:xfrm>
-            <a:off x="10272896" y="13526378"/>
-            <a:ext cx="12884418" cy="6516886"/>
+            <a:off x="26170759" y="7638372"/>
+            <a:ext cx="8068400" cy="8820081"/>
           </a:xfrm>
           <a:prstGeom prst="rect">
             <a:avLst/>
@@ -6389,7 +5687,7 @@
         </p:nvSpPr>
         <p:spPr>
           <a:xfrm>
-            <a:off x="280367" y="17221597"/>
+            <a:off x="258554" y="19895714"/>
             <a:ext cx="9308709" cy="757782"/>
           </a:xfrm>
           <a:prstGeom prst="rect">
@@ -6445,7 +5743,7 @@
           <p:nvPr/>
         </p:nvPicPr>
         <p:blipFill>
-          <a:blip r:embed="rId6">
+          <a:blip r:embed="rId5">
             <a:extLst>
               <a:ext uri="{28A0092B-C50C-407E-A947-70E740481C1C}">
                 <a14:useLocalDpi xmlns:a14="http://schemas.microsoft.com/office/drawing/2010/main" val="0"/>
@@ -6459,8 +5757,8 @@
         </p:blipFill>
         <p:spPr bwMode="auto">
           <a:xfrm>
-            <a:off x="678319" y="546637"/>
-            <a:ext cx="4572000" cy="1361777"/>
+            <a:off x="555853" y="897647"/>
+            <a:ext cx="4041224" cy="1203685"/>
           </a:xfrm>
           <a:prstGeom prst="rect">
             <a:avLst/>
@@ -6605,36 +5903,6 @@
       </p:sp>
       <p:pic>
         <p:nvPicPr>
-          <p:cNvPr id="6" name="Picture 5">
-            <a:extLst>
-              <a:ext uri="{FF2B5EF4-FFF2-40B4-BE49-F238E27FC236}">
-                <a16:creationId xmlns:a16="http://schemas.microsoft.com/office/drawing/2014/main" id="{8B332BC5-4E97-CC33-D945-00069E52C3A6}"/>
-              </a:ext>
-            </a:extLst>
-          </p:cNvPr>
-          <p:cNvPicPr>
-            <a:picLocks noChangeAspect="1"/>
-          </p:cNvPicPr>
-          <p:nvPr/>
-        </p:nvPicPr>
-        <p:blipFill>
-          <a:blip r:embed="rId7"/>
-          <a:stretch>
-            <a:fillRect/>
-          </a:stretch>
-        </p:blipFill>
-        <p:spPr>
-          <a:xfrm>
-            <a:off x="425609" y="18203196"/>
-            <a:ext cx="8990250" cy="4285279"/>
-          </a:xfrm>
-          <a:prstGeom prst="rect">
-            <a:avLst/>
-          </a:prstGeom>
-        </p:spPr>
-      </p:pic>
-      <p:pic>
-        <p:nvPicPr>
           <p:cNvPr id="7" name="Picture 6">
             <a:extLst>
               <a:ext uri="{FF2B5EF4-FFF2-40B4-BE49-F238E27FC236}">
@@ -6648,7 +5916,7 @@
           <p:nvPr/>
         </p:nvPicPr>
         <p:blipFill>
-          <a:blip r:embed="rId8"/>
+          <a:blip r:embed="rId6"/>
           <a:srcRect t="3096"/>
           <a:stretch>
             <a:fillRect/>
@@ -6656,7 +5924,7 @@
         </p:blipFill>
         <p:spPr>
           <a:xfrm>
-            <a:off x="95292" y="10669035"/>
+            <a:off x="222259" y="10257407"/>
             <a:ext cx="9678855" cy="6516886"/>
           </a:xfrm>
           <a:prstGeom prst="rect">
@@ -6664,86 +5932,280 @@
           </a:prstGeom>
         </p:spPr>
       </p:pic>
+      <p:pic>
+        <p:nvPicPr>
+          <p:cNvPr id="5" name="Picture 4">
+            <a:extLst>
+              <a:ext uri="{FF2B5EF4-FFF2-40B4-BE49-F238E27FC236}">
+                <a16:creationId xmlns:a16="http://schemas.microsoft.com/office/drawing/2014/main" id="{0E1FD044-2C70-68D1-9427-2D62B946F8CC}"/>
+              </a:ext>
+            </a:extLst>
+          </p:cNvPr>
+          <p:cNvPicPr>
+            <a:picLocks noChangeAspect="1"/>
+          </p:cNvPicPr>
+          <p:nvPr/>
+        </p:nvPicPr>
+        <p:blipFill>
+          <a:blip r:embed="rId7"/>
+          <a:srcRect l="5104" r="3633"/>
+          <a:stretch>
+            <a:fillRect/>
+          </a:stretch>
+        </p:blipFill>
+        <p:spPr>
+          <a:xfrm>
+            <a:off x="222259" y="16803692"/>
+            <a:ext cx="23507169" cy="3491415"/>
+          </a:xfrm>
+          <a:prstGeom prst="rect">
+            <a:avLst/>
+          </a:prstGeom>
+        </p:spPr>
+      </p:pic>
+      <mc:AlternateContent xmlns:mc="http://schemas.openxmlformats.org/markup-compatibility/2006">
+        <mc:Choice xmlns:a14="http://schemas.microsoft.com/office/drawing/2010/main" Requires="a14">
+          <p:sp>
+            <p:nvSpPr>
+              <p:cNvPr id="9" name="TextBox 8">
+                <a:extLst>
+                  <a:ext uri="{FF2B5EF4-FFF2-40B4-BE49-F238E27FC236}">
+                    <a16:creationId xmlns:a16="http://schemas.microsoft.com/office/drawing/2014/main" id="{BE360BD2-30A0-CACE-B288-ACED3FE1CD35}"/>
+                  </a:ext>
+                </a:extLst>
+              </p:cNvPr>
+              <p:cNvSpPr txBox="1"/>
+              <p:nvPr/>
+            </p:nvSpPr>
+            <p:spPr>
+              <a:xfrm>
+                <a:off x="2526844" y="18603130"/>
+                <a:ext cx="4779193" cy="523220"/>
+              </a:xfrm>
+              <a:prstGeom prst="rect">
+                <a:avLst/>
+              </a:prstGeom>
+              <a:noFill/>
+            </p:spPr>
+            <p:txBody>
+              <a:bodyPr wrap="none" rtlCol="0">
+                <a:spAutoFit/>
+              </a:bodyPr>
+              <a:lstStyle/>
+              <a:p>
+                <a14:m>
+                  <m:oMathPara xmlns:m="http://schemas.openxmlformats.org/officeDocument/2006/math">
+                    <m:oMathParaPr>
+                      <m:jc m:val="centerGroup"/>
+                    </m:oMathParaPr>
+                    <m:oMath xmlns:m="http://schemas.openxmlformats.org/officeDocument/2006/math">
+                      <m:sSub>
+                        <m:sSubPr>
+                          <m:ctrlPr>
+                            <a:rPr lang="en-US" sz="2800" i="1" dirty="0" smtClean="0">
+                              <a:latin typeface="Cambria Math" panose="02040503050406030204" pitchFamily="18" charset="0"/>
+                            </a:rPr>
+                          </m:ctrlPr>
+                        </m:sSubPr>
+                        <m:e>
+                          <m:r>
+                            <a:rPr lang="en-US" sz="2800" i="1" dirty="0" err="1">
+                              <a:latin typeface="Cambria Math" panose="02040503050406030204" pitchFamily="18" charset="0"/>
+                            </a:rPr>
+                            <m:t>𝐼</m:t>
+                          </m:r>
+                        </m:e>
+                        <m:sub>
+                          <m:r>
+                            <a:rPr lang="en-US" sz="2800" i="1" dirty="0" err="1">
+                              <a:latin typeface="Cambria Math" panose="02040503050406030204" pitchFamily="18" charset="0"/>
+                            </a:rPr>
+                            <m:t>𝑘</m:t>
+                          </m:r>
+                        </m:sub>
+                      </m:sSub>
+                      <m:r>
+                        <a:rPr lang="en-US" sz="2800" i="1" dirty="0">
+                          <a:latin typeface="Cambria Math" panose="02040503050406030204" pitchFamily="18" charset="0"/>
+                        </a:rPr>
+                        <m:t>=</m:t>
+                      </m:r>
+                      <m:r>
+                        <m:rPr>
+                          <m:sty m:val="p"/>
+                        </m:rPr>
+                        <a:rPr lang="en-US" sz="2800" b="0" i="1" dirty="0" smtClean="0">
+                          <a:latin typeface="Cambria Math" panose="02040503050406030204" pitchFamily="18" charset="0"/>
+                        </a:rPr>
+                        <m:t>k</m:t>
+                      </m:r>
+                      <m:r>
+                        <m:rPr>
+                          <m:nor/>
+                        </m:rPr>
+                        <a:rPr lang="en-US" sz="2800" b="0" i="0" dirty="0" smtClean="0">
+                          <a:latin typeface="Cambria Math" panose="02040503050406030204" pitchFamily="18" charset="0"/>
+                        </a:rPr>
+                        <m:t>-</m:t>
+                      </m:r>
+                      <m:r>
+                        <m:rPr>
+                          <m:sty m:val="p"/>
+                        </m:rPr>
+                        <a:rPr lang="en-US" sz="2800" b="0" i="1" dirty="0" smtClean="0">
+                          <a:latin typeface="Cambria Math" panose="02040503050406030204" pitchFamily="18" charset="0"/>
+                        </a:rPr>
+                        <m:t>argmax</m:t>
+                      </m:r>
+                      <m:d>
+                        <m:dPr>
+                          <m:ctrlPr>
+                            <a:rPr lang="en-US" sz="2800" i="1" dirty="0">
+                              <a:latin typeface="Cambria Math" panose="02040503050406030204" pitchFamily="18" charset="0"/>
+                            </a:rPr>
+                          </m:ctrlPr>
+                        </m:dPr>
+                        <m:e>
+                          <m:r>
+                            <a:rPr lang="en-US" sz="2800" i="1" dirty="0">
+                              <a:latin typeface="Cambria Math" panose="02040503050406030204" pitchFamily="18" charset="0"/>
+                            </a:rPr>
+                            <m:t>𝑋</m:t>
+                          </m:r>
+                          <m:sSup>
+                            <m:sSupPr>
+                              <m:ctrlPr>
+                                <a:rPr lang="en-US" sz="2800" i="1" dirty="0">
+                                  <a:latin typeface="Cambria Math" panose="02040503050406030204" pitchFamily="18" charset="0"/>
+                                </a:rPr>
+                              </m:ctrlPr>
+                            </m:sSupPr>
+                            <m:e>
+                              <m:r>
+                                <a:rPr lang="en-US" sz="2800" i="1" dirty="0">
+                                  <a:latin typeface="Cambria Math" panose="02040503050406030204" pitchFamily="18" charset="0"/>
+                                </a:rPr>
+                                <m:t>𝑋</m:t>
+                              </m:r>
+                            </m:e>
+                            <m:sup>
+                              <m:r>
+                                <a:rPr lang="en-US" sz="2800" i="1" dirty="0">
+                                  <a:latin typeface="Cambria Math" panose="02040503050406030204" pitchFamily="18" charset="0"/>
+                                </a:rPr>
+                                <m:t>⊤</m:t>
+                              </m:r>
+                            </m:sup>
+                          </m:sSup>
+                        </m:e>
+                      </m:d>
+                      <m:r>
+                        <a:rPr lang="en-US" sz="2800" i="1" dirty="0">
+                          <a:latin typeface="Cambria Math" panose="02040503050406030204" pitchFamily="18" charset="0"/>
+                        </a:rPr>
+                        <m:t>∈</m:t>
+                      </m:r>
+                      <m:sSup>
+                        <m:sSupPr>
+                          <m:ctrlPr>
+                            <a:rPr lang="en-US" sz="2800" i="1" dirty="0">
+                              <a:latin typeface="Cambria Math" panose="02040503050406030204" pitchFamily="18" charset="0"/>
+                            </a:rPr>
+                          </m:ctrlPr>
+                        </m:sSupPr>
+                        <m:e>
+                          <m:r>
+                            <a:rPr lang="en-US" sz="2800" i="1" dirty="0" smtClean="0">
+                              <a:latin typeface="Cambria Math" panose="02040503050406030204" pitchFamily="18" charset="0"/>
+                              <a:ea typeface="Cambria Math" panose="02040503050406030204" pitchFamily="18" charset="0"/>
+                            </a:rPr>
+                            <m:t>ℝ</m:t>
+                          </m:r>
+                        </m:e>
+                        <m:sup>
+                          <m:r>
+                            <a:rPr lang="en-US" sz="2800" i="1" dirty="0">
+                              <a:latin typeface="Cambria Math" panose="02040503050406030204" pitchFamily="18" charset="0"/>
+                            </a:rPr>
+                            <m:t>𝑛</m:t>
+                          </m:r>
+                          <m:r>
+                            <a:rPr lang="en-US" sz="2800" i="1" dirty="0">
+                              <a:latin typeface="Cambria Math" panose="02040503050406030204" pitchFamily="18" charset="0"/>
+                            </a:rPr>
+                            <m:t>×</m:t>
+                          </m:r>
+                          <m:r>
+                            <a:rPr lang="en-US" sz="2800" i="1" dirty="0">
+                              <a:latin typeface="Cambria Math" panose="02040503050406030204" pitchFamily="18" charset="0"/>
+                            </a:rPr>
+                            <m:t>𝑛</m:t>
+                          </m:r>
+                        </m:sup>
+                      </m:sSup>
+                      <m:r>
+                        <a:rPr lang="en-US" sz="2800" i="1" dirty="0">
+                          <a:latin typeface="Cambria Math" panose="02040503050406030204" pitchFamily="18" charset="0"/>
+                        </a:rPr>
+                        <m:t>.</m:t>
+                      </m:r>
+                    </m:oMath>
+                  </m:oMathPara>
+                </a14:m>
+              </a:p>
+            </p:txBody>
+          </p:sp>
+        </mc:Choice>
+        <mc:Fallback>
+          <p:sp>
+            <p:nvSpPr>
+              <p:cNvPr id="9" name="TextBox 8">
+                <a:extLst>
+                  <a:ext uri="{FF2B5EF4-FFF2-40B4-BE49-F238E27FC236}">
+                    <a16:creationId xmlns:a16="http://schemas.microsoft.com/office/drawing/2014/main" id="{BE360BD2-30A0-CACE-B288-ACED3FE1CD35}"/>
+                  </a:ext>
+                </a:extLst>
+              </p:cNvPr>
+              <p:cNvSpPr txBox="1">
+                <a:spLocks noRot="1" noChangeAspect="1" noMove="1" noResize="1" noEditPoints="1" noAdjustHandles="1" noChangeArrowheads="1" noChangeShapeType="1" noTextEdit="1"/>
+              </p:cNvSpPr>
+              <p:nvPr/>
+            </p:nvSpPr>
+            <p:spPr>
+              <a:xfrm>
+                <a:off x="2526844" y="18603130"/>
+                <a:ext cx="4779193" cy="523220"/>
+              </a:xfrm>
+              <a:prstGeom prst="rect">
+                <a:avLst/>
+              </a:prstGeom>
+              <a:blipFill>
+                <a:blip r:embed="rId8"/>
+                <a:stretch>
+                  <a:fillRect t="-11628" r="-2918" b="-27907"/>
+                </a:stretch>
+              </a:blipFill>
+            </p:spPr>
+            <p:txBody>
+              <a:bodyPr/>
+              <a:lstStyle/>
+              <a:p>
+                <a:r>
+                  <a:rPr lang="en-US">
+                    <a:noFill/>
+                  </a:rPr>
+                  <a:t> </a:t>
+                </a:r>
+              </a:p>
+            </p:txBody>
+          </p:sp>
+        </mc:Fallback>
+      </mc:AlternateContent>
     </p:spTree>
   </p:cSld>
   <p:clrMapOvr>
     <a:masterClrMapping/>
   </p:clrMapOvr>
-  <p:timing>
-    <p:tnLst>
-      <p:par>
-        <p:cTn id="1" dur="indefinite" restart="never" nodeType="tmRoot">
-          <p:childTnLst>
-            <p:seq concurrent="1" nextAc="seek">
-              <p:cTn id="2" dur="indefinite" nodeType="mainSeq">
-                <p:childTnLst>
-                  <p:par>
-                    <p:cTn id="3" fill="hold">
-                      <p:stCondLst>
-                        <p:cond delay="indefinite"/>
-                      </p:stCondLst>
-                      <p:childTnLst>
-                        <p:par>
-                          <p:cTn id="4" fill="hold">
-                            <p:stCondLst>
-                              <p:cond delay="0"/>
-                            </p:stCondLst>
-                            <p:childTnLst>
-                              <p:par>
-                                <p:cTn id="5" presetID="1" presetClass="entr" presetSubtype="0" fill="hold" nodeType="clickEffect">
-                                  <p:stCondLst>
-                                    <p:cond delay="0"/>
-                                  </p:stCondLst>
-                                  <p:childTnLst>
-                                    <p:set>
-                                      <p:cBhvr>
-                                        <p:cTn id="6" dur="1" fill="hold">
-                                          <p:stCondLst>
-                                            <p:cond delay="0"/>
-                                          </p:stCondLst>
-                                        </p:cTn>
-                                        <p:tgtEl>
-                                          <p:spTgt spid="69"/>
-                                        </p:tgtEl>
-                                        <p:attrNameLst>
-                                          <p:attrName>style.visibility</p:attrName>
-                                        </p:attrNameLst>
-                                      </p:cBhvr>
-                                      <p:to>
-                                        <p:strVal val="visible"/>
-                                      </p:to>
-                                    </p:set>
-                                  </p:childTnLst>
-                                </p:cTn>
-                              </p:par>
-                            </p:childTnLst>
-                          </p:cTn>
-                        </p:par>
-                      </p:childTnLst>
-                    </p:cTn>
-                  </p:par>
-                </p:childTnLst>
-              </p:cTn>
-              <p:prevCondLst>
-                <p:cond evt="onPrev" delay="0">
-                  <p:tgtEl>
-                    <p:sldTgt/>
-                  </p:tgtEl>
-                </p:cond>
-              </p:prevCondLst>
-              <p:nextCondLst>
-                <p:cond evt="onNext" delay="0">
-                  <p:tgtEl>
-                    <p:sldTgt/>
-                  </p:tgtEl>
-                </p:cond>
-              </p:nextCondLst>
-            </p:seq>
-          </p:childTnLst>
-        </p:cTn>
-      </p:par>
-    </p:tnLst>
-  </p:timing>
 </p:sld>
 </file>
 

</xml_diff>

<commit_message>
[Test] Run same experiments used in MIT URTC with CIFAR100
</commit_message>
<xml_diff>
--- a/Project Docs/ConvNN Poster.pptx
+++ b/Project Docs/ConvNN Poster.pptx
@@ -4239,7 +4239,7 @@
                 <a:cs typeface="Cambria"/>
                 <a:sym typeface="Cambria"/>
               </a:rPr>
-              <a:t>Mingi Kang, Jeova Farias Sales Rocha Neto PhD. </a:t>
+              <a:t>Mingi Kang, Jeova Farias Ph.D. </a:t>
             </a:r>
             <a:endParaRPr sz="2994" dirty="0">
               <a:solidFill>
@@ -6126,8 +6126,8 @@
           </a:prstGeom>
         </p:spPr>
       </p:pic>
-      <mc:AlternateContent xmlns:mc="http://schemas.openxmlformats.org/markup-compatibility/2006">
-        <mc:Choice xmlns:a14="http://schemas.microsoft.com/office/drawing/2010/main" Requires="a14">
+      <mc:AlternateContent xmlns:mc="http://schemas.openxmlformats.org/markup-compatibility/2006" xmlns:a14="http://schemas.microsoft.com/office/drawing/2010/main">
+        <mc:Choice Requires="a14">
           <p:sp>
             <p:nvSpPr>
               <p:cNvPr id="42" name="Google Shape;65;p14">
@@ -6437,7 +6437,7 @@
             </p:txBody>
           </p:sp>
         </mc:Choice>
-        <mc:Fallback>
+        <mc:Fallback xmlns="">
           <p:sp>
             <p:nvSpPr>
               <p:cNvPr id="42" name="Google Shape;65;p14">
@@ -6485,8 +6485,8 @@
           </p:sp>
         </mc:Fallback>
       </mc:AlternateContent>
-      <mc:AlternateContent xmlns:mc="http://schemas.openxmlformats.org/markup-compatibility/2006">
-        <mc:Choice xmlns:a14="http://schemas.microsoft.com/office/drawing/2010/main" Requires="a14">
+      <mc:AlternateContent xmlns:mc="http://schemas.openxmlformats.org/markup-compatibility/2006" xmlns:a14="http://schemas.microsoft.com/office/drawing/2010/main">
+        <mc:Choice Requires="a14">
           <p:sp>
             <p:nvSpPr>
               <p:cNvPr id="43" name="Google Shape;65;p14">
@@ -6739,7 +6739,7 @@
             </p:txBody>
           </p:sp>
         </mc:Choice>
-        <mc:Fallback>
+        <mc:Fallback xmlns="">
           <p:sp>
             <p:nvSpPr>
               <p:cNvPr id="43" name="Google Shape;65;p14">
@@ -6787,8 +6787,8 @@
           </p:sp>
         </mc:Fallback>
       </mc:AlternateContent>
-      <mc:AlternateContent xmlns:mc="http://schemas.openxmlformats.org/markup-compatibility/2006">
-        <mc:Choice xmlns:a14="http://schemas.microsoft.com/office/drawing/2010/main" Requires="a14">
+      <mc:AlternateContent xmlns:mc="http://schemas.openxmlformats.org/markup-compatibility/2006" xmlns:a14="http://schemas.microsoft.com/office/drawing/2010/main">
+        <mc:Choice Requires="a14">
           <p:sp>
             <p:nvSpPr>
               <p:cNvPr id="44" name="TextBox 43">
@@ -6972,7 +6972,7 @@
             </p:txBody>
           </p:sp>
         </mc:Choice>
-        <mc:Fallback>
+        <mc:Fallback xmlns="">
           <p:sp>
             <p:nvSpPr>
               <p:cNvPr id="44" name="TextBox 43">
@@ -7017,8 +7017,8 @@
           </p:sp>
         </mc:Fallback>
       </mc:AlternateContent>
-      <mc:AlternateContent xmlns:mc="http://schemas.openxmlformats.org/markup-compatibility/2006">
-        <mc:Choice xmlns:a14="http://schemas.microsoft.com/office/drawing/2010/main" Requires="a14">
+      <mc:AlternateContent xmlns:mc="http://schemas.openxmlformats.org/markup-compatibility/2006" xmlns:a14="http://schemas.microsoft.com/office/drawing/2010/main">
+        <mc:Choice Requires="a14">
           <p:sp>
             <p:nvSpPr>
               <p:cNvPr id="45" name="TextBox 44">
@@ -7278,7 +7278,7 @@
             </p:txBody>
           </p:sp>
         </mc:Choice>
-        <mc:Fallback>
+        <mc:Fallback xmlns="">
           <p:sp>
             <p:nvSpPr>
               <p:cNvPr id="45" name="TextBox 44">
@@ -7378,8 +7378,8 @@
           </a:p>
         </p:txBody>
       </p:sp>
-      <mc:AlternateContent xmlns:mc="http://schemas.openxmlformats.org/markup-compatibility/2006">
-        <mc:Choice xmlns:a14="http://schemas.microsoft.com/office/drawing/2010/main" Requires="a14">
+      <mc:AlternateContent xmlns:mc="http://schemas.openxmlformats.org/markup-compatibility/2006" xmlns:a14="http://schemas.microsoft.com/office/drawing/2010/main">
+        <mc:Choice Requires="a14">
           <p:sp>
             <p:nvSpPr>
               <p:cNvPr id="6" name="TextBox 5">
@@ -7810,7 +7810,7 @@
             </p:txBody>
           </p:sp>
         </mc:Choice>
-        <mc:Fallback>
+        <mc:Fallback xmlns="">
           <p:sp>
             <p:nvSpPr>
               <p:cNvPr id="6" name="TextBox 5">
@@ -7855,8 +7855,8 @@
           </p:sp>
         </mc:Fallback>
       </mc:AlternateContent>
-      <mc:AlternateContent xmlns:mc="http://schemas.openxmlformats.org/markup-compatibility/2006">
-        <mc:Choice xmlns:a14="http://schemas.microsoft.com/office/drawing/2010/main" Requires="a14">
+      <mc:AlternateContent xmlns:mc="http://schemas.openxmlformats.org/markup-compatibility/2006" xmlns:a14="http://schemas.microsoft.com/office/drawing/2010/main">
+        <mc:Choice Requires="a14">
           <p:sp>
             <p:nvSpPr>
               <p:cNvPr id="7" name="TextBox 6">
@@ -8057,7 +8057,7 @@
             </p:txBody>
           </p:sp>
         </mc:Choice>
-        <mc:Fallback>
+        <mc:Fallback xmlns="">
           <p:sp>
             <p:nvSpPr>
               <p:cNvPr id="7" name="TextBox 6">
@@ -8157,8 +8157,8 @@
           </a:p>
         </p:txBody>
       </p:sp>
-      <mc:AlternateContent xmlns:mc="http://schemas.openxmlformats.org/markup-compatibility/2006">
-        <mc:Choice xmlns:a14="http://schemas.microsoft.com/office/drawing/2010/main" Requires="a14">
+      <mc:AlternateContent xmlns:mc="http://schemas.openxmlformats.org/markup-compatibility/2006" xmlns:a14="http://schemas.microsoft.com/office/drawing/2010/main">
+        <mc:Choice Requires="a14">
           <p:sp>
             <p:nvSpPr>
               <p:cNvPr id="10" name="TextBox 9">
@@ -8342,7 +8342,7 @@
             </p:txBody>
           </p:sp>
         </mc:Choice>
-        <mc:Fallback>
+        <mc:Fallback xmlns="">
           <p:sp>
             <p:nvSpPr>
               <p:cNvPr id="10" name="TextBox 9">
@@ -8387,8 +8387,8 @@
           </p:sp>
         </mc:Fallback>
       </mc:AlternateContent>
-      <mc:AlternateContent xmlns:mc="http://schemas.openxmlformats.org/markup-compatibility/2006">
-        <mc:Choice xmlns:a14="http://schemas.microsoft.com/office/drawing/2010/main" Requires="a14">
+      <mc:AlternateContent xmlns:mc="http://schemas.openxmlformats.org/markup-compatibility/2006" xmlns:a14="http://schemas.microsoft.com/office/drawing/2010/main">
+        <mc:Choice Requires="a14">
           <p:sp>
             <p:nvSpPr>
               <p:cNvPr id="11" name="TextBox 10">
@@ -8648,7 +8648,7 @@
             </p:txBody>
           </p:sp>
         </mc:Choice>
-        <mc:Fallback>
+        <mc:Fallback xmlns="">
           <p:sp>
             <p:nvSpPr>
               <p:cNvPr id="11" name="TextBox 10">
@@ -8748,8 +8748,8 @@
           </a:p>
         </p:txBody>
       </p:sp>
-      <mc:AlternateContent xmlns:mc="http://schemas.openxmlformats.org/markup-compatibility/2006">
-        <mc:Choice xmlns:a14="http://schemas.microsoft.com/office/drawing/2010/main" Requires="a14">
+      <mc:AlternateContent xmlns:mc="http://schemas.openxmlformats.org/markup-compatibility/2006" xmlns:a14="http://schemas.microsoft.com/office/drawing/2010/main">
+        <mc:Choice Requires="a14">
           <p:sp>
             <p:nvSpPr>
               <p:cNvPr id="13" name="TextBox 12">
@@ -8992,7 +8992,7 @@
             </p:txBody>
           </p:sp>
         </mc:Choice>
-        <mc:Fallback>
+        <mc:Fallback xmlns="">
           <p:sp>
             <p:nvSpPr>
               <p:cNvPr id="13" name="TextBox 12">
@@ -9037,8 +9037,8 @@
           </p:sp>
         </mc:Fallback>
       </mc:AlternateContent>
-      <mc:AlternateContent xmlns:mc="http://schemas.openxmlformats.org/markup-compatibility/2006">
-        <mc:Choice xmlns:a14="http://schemas.microsoft.com/office/drawing/2010/main" Requires="a14">
+      <mc:AlternateContent xmlns:mc="http://schemas.openxmlformats.org/markup-compatibility/2006" xmlns:a14="http://schemas.microsoft.com/office/drawing/2010/main">
+        <mc:Choice Requires="a14">
           <p:sp>
             <p:nvSpPr>
               <p:cNvPr id="14" name="TextBox 13">
@@ -9304,7 +9304,7 @@
             </p:txBody>
           </p:sp>
         </mc:Choice>
-        <mc:Fallback>
+        <mc:Fallback xmlns="">
           <p:sp>
             <p:nvSpPr>
               <p:cNvPr id="14" name="TextBox 13">
@@ -9701,8 +9701,8 @@
           </a:p>
         </p:txBody>
       </p:sp>
-      <mc:AlternateContent xmlns:mc="http://schemas.openxmlformats.org/markup-compatibility/2006">
-        <mc:Choice xmlns:a14="http://schemas.microsoft.com/office/drawing/2010/main" Requires="a14">
+      <mc:AlternateContent xmlns:mc="http://schemas.openxmlformats.org/markup-compatibility/2006" xmlns:a14="http://schemas.microsoft.com/office/drawing/2010/main">
+        <mc:Choice Requires="a14">
           <p:sp>
             <p:nvSpPr>
               <p:cNvPr id="24" name="TextBox 23">
@@ -9906,7 +9906,7 @@
             </p:txBody>
           </p:sp>
         </mc:Choice>
-        <mc:Fallback>
+        <mc:Fallback xmlns="">
           <p:sp>
             <p:nvSpPr>
               <p:cNvPr id="24" name="TextBox 23">
@@ -10071,8 +10071,8 @@
           </a:prstGeom>
         </p:spPr>
       </p:pic>
-      <mc:AlternateContent xmlns:mc="http://schemas.openxmlformats.org/markup-compatibility/2006">
-        <mc:Choice xmlns:a14="http://schemas.microsoft.com/office/drawing/2010/main" Requires="a14">
+      <mc:AlternateContent xmlns:mc="http://schemas.openxmlformats.org/markup-compatibility/2006" xmlns:a14="http://schemas.microsoft.com/office/drawing/2010/main">
+        <mc:Choice Requires="a14">
           <p:sp>
             <p:nvSpPr>
               <p:cNvPr id="35" name="TextBox 34">
@@ -10276,7 +10276,7 @@
             </p:txBody>
           </p:sp>
         </mc:Choice>
-        <mc:Fallback>
+        <mc:Fallback xmlns="">
           <p:sp>
             <p:nvSpPr>
               <p:cNvPr id="35" name="TextBox 34">
@@ -10321,8 +10321,8 @@
           </p:sp>
         </mc:Fallback>
       </mc:AlternateContent>
-      <mc:AlternateContent xmlns:mc="http://schemas.openxmlformats.org/markup-compatibility/2006">
-        <mc:Choice xmlns:a14="http://schemas.microsoft.com/office/drawing/2010/main" Requires="a14">
+      <mc:AlternateContent xmlns:mc="http://schemas.openxmlformats.org/markup-compatibility/2006" xmlns:a14="http://schemas.microsoft.com/office/drawing/2010/main">
+        <mc:Choice Requires="a14">
           <p:sp>
             <p:nvSpPr>
               <p:cNvPr id="36" name="TextBox 35">
@@ -10526,7 +10526,7 @@
             </p:txBody>
           </p:sp>
         </mc:Choice>
-        <mc:Fallback>
+        <mc:Fallback xmlns="">
           <p:sp>
             <p:nvSpPr>
               <p:cNvPr id="36" name="TextBox 35">
@@ -10571,8 +10571,8 @@
           </p:sp>
         </mc:Fallback>
       </mc:AlternateContent>
-      <mc:AlternateContent xmlns:mc="http://schemas.openxmlformats.org/markup-compatibility/2006">
-        <mc:Choice xmlns:a14="http://schemas.microsoft.com/office/drawing/2010/main" Requires="a14">
+      <mc:AlternateContent xmlns:mc="http://schemas.openxmlformats.org/markup-compatibility/2006" xmlns:a14="http://schemas.microsoft.com/office/drawing/2010/main">
+        <mc:Choice Requires="a14">
           <p:sp>
             <p:nvSpPr>
               <p:cNvPr id="47" name="TextBox 46">
@@ -10757,13 +10757,7 @@
                         <a:rPr lang="en-US" sz="2800" b="0" i="1" dirty="0" smtClean="0">
                           <a:latin typeface="Cambria Math" panose="02040503050406030204" pitchFamily="18" charset="0"/>
                         </a:rPr>
-                        <m:t>)</m:t>
-                      </m:r>
-                      <m:r>
-                        <a:rPr lang="en-US" sz="2800" b="0" i="1" dirty="0" smtClean="0">
-                          <a:latin typeface="Cambria Math" panose="02040503050406030204" pitchFamily="18" charset="0"/>
-                        </a:rPr>
-                        <m:t> </m:t>
+                        <m:t>) </m:t>
                       </m:r>
                       <m:r>
                         <a:rPr lang="en-US" sz="2800" b="0" i="1" dirty="0" smtClean="0">
@@ -10828,7 +10822,7 @@
             </p:txBody>
           </p:sp>
         </mc:Choice>
-        <mc:Fallback>
+        <mc:Fallback xmlns="">
           <p:sp>
             <p:nvSpPr>
               <p:cNvPr id="47" name="TextBox 46">

</xml_diff>

<commit_message>
[Updates] ResNet implementation and unified main.py file
</commit_message>
<xml_diff>
--- a/Project Docs/ConvNN Poster.pptx
+++ b/Project Docs/ConvNN Poster.pptx
@@ -197,7 +197,7 @@
           <a:p>
             <a:fld id="{97F067A0-B807-594B-857C-0B1CA98D0658}" type="datetimeFigureOut">
               <a:rPr lang="en-US" smtClean="0"/>
-              <a:t>9/28/25</a:t>
+              <a:t>10/6/25</a:t>
             </a:fld>
             <a:endParaRPr lang="en-US"/>
           </a:p>
@@ -736,7 +736,7 @@
           <a:p>
             <a:fld id="{2A84CB3F-E3C1-5B40-88B8-D14386A89107}" type="datetimeFigureOut">
               <a:rPr lang="en-US" smtClean="0"/>
-              <a:t>9/28/25</a:t>
+              <a:t>10/6/25</a:t>
             </a:fld>
             <a:endParaRPr lang="en-US"/>
           </a:p>
@@ -906,7 +906,7 @@
           <a:p>
             <a:fld id="{2A84CB3F-E3C1-5B40-88B8-D14386A89107}" type="datetimeFigureOut">
               <a:rPr lang="en-US" smtClean="0"/>
-              <a:t>9/28/25</a:t>
+              <a:t>10/6/25</a:t>
             </a:fld>
             <a:endParaRPr lang="en-US"/>
           </a:p>
@@ -1086,7 +1086,7 @@
           <a:p>
             <a:fld id="{2A84CB3F-E3C1-5B40-88B8-D14386A89107}" type="datetimeFigureOut">
               <a:rPr lang="en-US" smtClean="0"/>
-              <a:t>9/28/25</a:t>
+              <a:t>10/6/25</a:t>
             </a:fld>
             <a:endParaRPr lang="en-US"/>
           </a:p>
@@ -1820,7 +1820,7 @@
           <a:p>
             <a:fld id="{2A84CB3F-E3C1-5B40-88B8-D14386A89107}" type="datetimeFigureOut">
               <a:rPr lang="en-US" smtClean="0"/>
-              <a:t>9/28/25</a:t>
+              <a:t>10/6/25</a:t>
             </a:fld>
             <a:endParaRPr lang="en-US"/>
           </a:p>
@@ -2066,7 +2066,7 @@
           <a:p>
             <a:fld id="{2A84CB3F-E3C1-5B40-88B8-D14386A89107}" type="datetimeFigureOut">
               <a:rPr lang="en-US" smtClean="0"/>
-              <a:t>9/28/25</a:t>
+              <a:t>10/6/25</a:t>
             </a:fld>
             <a:endParaRPr lang="en-US"/>
           </a:p>
@@ -2298,7 +2298,7 @@
           <a:p>
             <a:fld id="{2A84CB3F-E3C1-5B40-88B8-D14386A89107}" type="datetimeFigureOut">
               <a:rPr lang="en-US" smtClean="0"/>
-              <a:t>9/28/25</a:t>
+              <a:t>10/6/25</a:t>
             </a:fld>
             <a:endParaRPr lang="en-US"/>
           </a:p>
@@ -2665,7 +2665,7 @@
           <a:p>
             <a:fld id="{2A84CB3F-E3C1-5B40-88B8-D14386A89107}" type="datetimeFigureOut">
               <a:rPr lang="en-US" smtClean="0"/>
-              <a:t>9/28/25</a:t>
+              <a:t>10/6/25</a:t>
             </a:fld>
             <a:endParaRPr lang="en-US"/>
           </a:p>
@@ -2783,7 +2783,7 @@
           <a:p>
             <a:fld id="{2A84CB3F-E3C1-5B40-88B8-D14386A89107}" type="datetimeFigureOut">
               <a:rPr lang="en-US" smtClean="0"/>
-              <a:t>9/28/25</a:t>
+              <a:t>10/6/25</a:t>
             </a:fld>
             <a:endParaRPr lang="en-US"/>
           </a:p>
@@ -2878,7 +2878,7 @@
           <a:p>
             <a:fld id="{2A84CB3F-E3C1-5B40-88B8-D14386A89107}" type="datetimeFigureOut">
               <a:rPr lang="en-US" smtClean="0"/>
-              <a:t>9/28/25</a:t>
+              <a:t>10/6/25</a:t>
             </a:fld>
             <a:endParaRPr lang="en-US"/>
           </a:p>
@@ -3155,7 +3155,7 @@
           <a:p>
             <a:fld id="{2A84CB3F-E3C1-5B40-88B8-D14386A89107}" type="datetimeFigureOut">
               <a:rPr lang="en-US" smtClean="0"/>
-              <a:t>9/28/25</a:t>
+              <a:t>10/6/25</a:t>
             </a:fld>
             <a:endParaRPr lang="en-US"/>
           </a:p>
@@ -3412,7 +3412,7 @@
           <a:p>
             <a:fld id="{2A84CB3F-E3C1-5B40-88B8-D14386A89107}" type="datetimeFigureOut">
               <a:rPr lang="en-US" smtClean="0"/>
-              <a:t>9/28/25</a:t>
+              <a:t>10/6/25</a:t>
             </a:fld>
             <a:endParaRPr lang="en-US"/>
           </a:p>
@@ -3625,7 +3625,7 @@
           <a:p>
             <a:fld id="{2A84CB3F-E3C1-5B40-88B8-D14386A89107}" type="datetimeFigureOut">
               <a:rPr lang="en-US" smtClean="0"/>
-              <a:t>9/28/25</a:t>
+              <a:t>10/6/25</a:t>
             </a:fld>
             <a:endParaRPr lang="en-US"/>
           </a:p>
@@ -5456,8 +5456,8 @@
         </p:nvSpPr>
         <p:spPr>
           <a:xfrm>
-            <a:off x="267582" y="33016176"/>
-            <a:ext cx="23256600" cy="1729935"/>
+            <a:off x="267582" y="32974611"/>
+            <a:ext cx="23256600" cy="1771484"/>
           </a:xfrm>
           <a:prstGeom prst="rect">
             <a:avLst/>
@@ -5519,29 +5519,20 @@
             </a:pPr>
             <a:r>
               <a:rPr lang="en-US" sz="1600" dirty="0"/>
-              <a:t>Singh, Sidak Pal, and Martin Jaggi. "Model fusion via optimal transport." </a:t>
+              <a:t>Simonyan, Karen, and Andrew Zisserman. "Very deep convolutional networks for large-scale image recognition." </a:t>
+            </a:r>
+            <a:r>
+              <a:rPr lang="en-US" sz="1600" i="1" dirty="0" err="1"/>
+              <a:t>arXiv</a:t>
             </a:r>
             <a:r>
               <a:rPr lang="en-US" sz="1600" i="1" dirty="0"/>
-              <a:t>Advances in Neural Information Processing Systems</a:t>
+              <a:t> preprint arXiv:1409.1556</a:t>
             </a:r>
             <a:r>
               <a:rPr lang="en-US" sz="1600" dirty="0"/>
-              <a:t> 33 (2020): 22045-22055.</a:t>
-            </a:r>
-          </a:p>
-          <a:p>
-            <a:pPr marL="400253" indent="-390247">
-              <a:lnSpc>
-                <a:spcPct val="135000"/>
-              </a:lnSpc>
-              <a:buClr>
-                <a:schemeClr val="dk1"/>
-              </a:buClr>
-              <a:buSzPts val="2800"/>
-              <a:buFont typeface="Arial" panose="020B0604020202020204" pitchFamily="34" charset="0"/>
-              <a:buChar char="•"/>
-            </a:pPr>
+              <a:t> (2014).</a:t>
+            </a:r>
             <a:r>
               <a:rPr lang="en-US" sz="1600" dirty="0" err="1"/>
               <a:t>Plötz</a:t>
@@ -6485,8 +6476,8 @@
           </p:sp>
         </mc:Fallback>
       </mc:AlternateContent>
-      <mc:AlternateContent xmlns:mc="http://schemas.openxmlformats.org/markup-compatibility/2006" xmlns:a14="http://schemas.microsoft.com/office/drawing/2010/main">
-        <mc:Choice Requires="a14">
+      <mc:AlternateContent xmlns:mc="http://schemas.openxmlformats.org/markup-compatibility/2006">
+        <mc:Choice xmlns:a14="http://schemas.microsoft.com/office/drawing/2010/main" Requires="a14">
           <p:sp>
             <p:nvSpPr>
               <p:cNvPr id="43" name="Google Shape;65;p14">
@@ -6632,31 +6623,7 @@
                     <a:cs typeface="Libre Franklin"/>
                     <a:sym typeface="Libre Franklin"/>
                   </a:rPr>
-                  <a:t> complexity of all to all similarity computation, we introduce two sampling methods: Random </a:t>
-                </a:r>
-                <a:r>
-                  <a:rPr lang="en-US" dirty="0" err="1">
-                    <a:solidFill>
-                      <a:schemeClr val="dk1"/>
-                    </a:solidFill>
-                    <a:latin typeface="Libre Franklin"/>
-                    <a:ea typeface="Libre Franklin"/>
-                    <a:cs typeface="Libre Franklin"/>
-                    <a:sym typeface="Libre Franklin"/>
-                  </a:rPr>
-                  <a:t>Sparsification</a:t>
-                </a:r>
-                <a:r>
-                  <a:rPr lang="en-US" dirty="0">
-                    <a:solidFill>
-                      <a:schemeClr val="dk1"/>
-                    </a:solidFill>
-                    <a:latin typeface="Libre Franklin"/>
-                    <a:ea typeface="Libre Franklin"/>
-                    <a:cs typeface="Libre Franklin"/>
-                    <a:sym typeface="Libre Franklin"/>
-                  </a:rPr>
-                  <a:t> and Spatial </a:t>
+                  <a:t> complexity of all to all similarity computation, we introduce two sampling methods: Random and Spatial </a:t>
                 </a:r>
                 <a:r>
                   <a:rPr lang="en-US" dirty="0" err="1">
@@ -6733,13 +6700,13 @@
                     <a:cs typeface="Libre Franklin"/>
                     <a:sym typeface="Libre Franklin"/>
                   </a:rPr>
-                  <a:t>.</a:t>
+                  <a:t> (number of pixel sampled).</a:t>
                 </a:r>
               </a:p>
             </p:txBody>
           </p:sp>
         </mc:Choice>
-        <mc:Fallback xmlns="">
+        <mc:Fallback>
           <p:sp>
             <p:nvSpPr>
               <p:cNvPr id="43" name="Google Shape;65;p14">
@@ -10011,66 +9978,6 @@
           </a:prstGeom>
         </p:spPr>
       </p:pic>
-      <p:pic>
-        <p:nvPicPr>
-          <p:cNvPr id="33" name="Picture 32">
-            <a:extLst>
-              <a:ext uri="{FF2B5EF4-FFF2-40B4-BE49-F238E27FC236}">
-                <a16:creationId xmlns:a16="http://schemas.microsoft.com/office/drawing/2014/main" id="{B8DD61B9-2E51-C854-F167-DD7368897C19}"/>
-              </a:ext>
-            </a:extLst>
-          </p:cNvPr>
-          <p:cNvPicPr>
-            <a:picLocks noChangeAspect="1"/>
-          </p:cNvPicPr>
-          <p:nvPr/>
-        </p:nvPicPr>
-        <p:blipFill>
-          <a:blip r:embed="rId25"/>
-          <a:stretch>
-            <a:fillRect/>
-          </a:stretch>
-        </p:blipFill>
-        <p:spPr>
-          <a:xfrm>
-            <a:off x="10017992" y="13542264"/>
-            <a:ext cx="6729984" cy="4206240"/>
-          </a:xfrm>
-          <a:prstGeom prst="rect">
-            <a:avLst/>
-          </a:prstGeom>
-        </p:spPr>
-      </p:pic>
-      <p:pic>
-        <p:nvPicPr>
-          <p:cNvPr id="34" name="Picture 33">
-            <a:extLst>
-              <a:ext uri="{FF2B5EF4-FFF2-40B4-BE49-F238E27FC236}">
-                <a16:creationId xmlns:a16="http://schemas.microsoft.com/office/drawing/2014/main" id="{6B617690-8A9F-7AF3-7C2E-C9D67D41C070}"/>
-              </a:ext>
-            </a:extLst>
-          </p:cNvPr>
-          <p:cNvPicPr>
-            <a:picLocks noChangeAspect="1"/>
-          </p:cNvPicPr>
-          <p:nvPr/>
-        </p:nvPicPr>
-        <p:blipFill>
-          <a:blip r:embed="rId26"/>
-          <a:stretch>
-            <a:fillRect/>
-          </a:stretch>
-        </p:blipFill>
-        <p:spPr>
-          <a:xfrm>
-            <a:off x="16818377" y="13542264"/>
-            <a:ext cx="6729984" cy="4206240"/>
-          </a:xfrm>
-          <a:prstGeom prst="rect">
-            <a:avLst/>
-          </a:prstGeom>
-        </p:spPr>
-      </p:pic>
       <mc:AlternateContent xmlns:mc="http://schemas.openxmlformats.org/markup-compatibility/2006" xmlns:a14="http://schemas.microsoft.com/office/drawing/2010/main">
         <mc:Choice Requires="a14">
           <p:sp>
@@ -10867,6 +10774,66 @@
           </p:sp>
         </mc:Fallback>
       </mc:AlternateContent>
+      <p:pic>
+        <p:nvPicPr>
+          <p:cNvPr id="9" name="Picture 8">
+            <a:extLst>
+              <a:ext uri="{FF2B5EF4-FFF2-40B4-BE49-F238E27FC236}">
+                <a16:creationId xmlns:a16="http://schemas.microsoft.com/office/drawing/2014/main" id="{A368385C-2637-1F7D-6EF5-829122839DC5}"/>
+              </a:ext>
+            </a:extLst>
+          </p:cNvPr>
+          <p:cNvPicPr>
+            <a:picLocks noChangeAspect="1"/>
+          </p:cNvPicPr>
+          <p:nvPr/>
+        </p:nvPicPr>
+        <p:blipFill>
+          <a:blip r:embed="rId30"/>
+          <a:stretch>
+            <a:fillRect/>
+          </a:stretch>
+        </p:blipFill>
+        <p:spPr>
+          <a:xfrm>
+            <a:off x="16829083" y="13624560"/>
+            <a:ext cx="6729984" cy="4206240"/>
+          </a:xfrm>
+          <a:prstGeom prst="rect">
+            <a:avLst/>
+          </a:prstGeom>
+        </p:spPr>
+      </p:pic>
+      <p:pic>
+        <p:nvPicPr>
+          <p:cNvPr id="18" name="Picture 17">
+            <a:extLst>
+              <a:ext uri="{FF2B5EF4-FFF2-40B4-BE49-F238E27FC236}">
+                <a16:creationId xmlns:a16="http://schemas.microsoft.com/office/drawing/2014/main" id="{325914C3-F711-0CB2-58F8-1E4C0B782ADD}"/>
+              </a:ext>
+            </a:extLst>
+          </p:cNvPr>
+          <p:cNvPicPr>
+            <a:picLocks noChangeAspect="1"/>
+          </p:cNvPicPr>
+          <p:nvPr/>
+        </p:nvPicPr>
+        <p:blipFill>
+          <a:blip r:embed="rId31"/>
+          <a:stretch>
+            <a:fillRect/>
+          </a:stretch>
+        </p:blipFill>
+        <p:spPr>
+          <a:xfrm>
+            <a:off x="10017992" y="13586852"/>
+            <a:ext cx="6729984" cy="4206240"/>
+          </a:xfrm>
+          <a:prstGeom prst="rect">
+            <a:avLst/>
+          </a:prstGeom>
+        </p:spPr>
+      </p:pic>
     </p:spTree>
   </p:cSld>
   <p:clrMapOvr>

</xml_diff>